<commit_message>
Deployed 94af227 with MkDocs version: 1.3.0
</commit_message>
<xml_diff>
--- a/exp3/images/irq.pptx
+++ b/exp3/images/irq.pptx
@@ -5,12 +5,13 @@
     <p:sldMasterId id="2147483648" r:id="rId1"/>
   </p:sldMasterIdLst>
   <p:sldIdLst>
-    <p:sldId id="269" r:id="rId2"/>
-    <p:sldId id="268" r:id="rId3"/>
-    <p:sldId id="266" r:id="rId4"/>
-    <p:sldId id="257" r:id="rId5"/>
-    <p:sldId id="264" r:id="rId6"/>
-    <p:sldId id="265" r:id="rId7"/>
+    <p:sldId id="270" r:id="rId2"/>
+    <p:sldId id="269" r:id="rId3"/>
+    <p:sldId id="268" r:id="rId4"/>
+    <p:sldId id="266" r:id="rId5"/>
+    <p:sldId id="257" r:id="rId6"/>
+    <p:sldId id="264" r:id="rId7"/>
+    <p:sldId id="265" r:id="rId8"/>
   </p:sldIdLst>
   <p:sldSz cx="9144000" cy="6858000" type="screen4x3"/>
   <p:notesSz cx="6858000" cy="9144000"/>
@@ -274,7 +275,7 @@
           <a:p>
             <a:fld id="{6F3343BF-7104-41BB-9DE2-F81E2A7FAF60}" type="datetimeFigureOut">
               <a:rPr lang="en-US" smtClean="0"/>
-              <a:t>2/22/2021</a:t>
+              <a:t>2/6/2023</a:t>
             </a:fld>
             <a:endParaRPr lang="en-US"/>
           </a:p>
@@ -472,7 +473,7 @@
           <a:p>
             <a:fld id="{6F3343BF-7104-41BB-9DE2-F81E2A7FAF60}" type="datetimeFigureOut">
               <a:rPr lang="en-US" smtClean="0"/>
-              <a:t>2/22/2021</a:t>
+              <a:t>2/6/2023</a:t>
             </a:fld>
             <a:endParaRPr lang="en-US"/>
           </a:p>
@@ -680,7 +681,7 @@
           <a:p>
             <a:fld id="{6F3343BF-7104-41BB-9DE2-F81E2A7FAF60}" type="datetimeFigureOut">
               <a:rPr lang="en-US" smtClean="0"/>
-              <a:t>2/22/2021</a:t>
+              <a:t>2/6/2023</a:t>
             </a:fld>
             <a:endParaRPr lang="en-US"/>
           </a:p>
@@ -1488,7 +1489,7 @@
           <a:p>
             <a:fld id="{6F3343BF-7104-41BB-9DE2-F81E2A7FAF60}" type="datetimeFigureOut">
               <a:rPr lang="en-US" smtClean="0"/>
-              <a:t>2/22/2021</a:t>
+              <a:t>2/6/2023</a:t>
             </a:fld>
             <a:endParaRPr lang="en-US"/>
           </a:p>
@@ -1783,7 +1784,7 @@
           <a:p>
             <a:fld id="{6F3343BF-7104-41BB-9DE2-F81E2A7FAF60}" type="datetimeFigureOut">
               <a:rPr lang="en-US" smtClean="0"/>
-              <a:t>2/22/2021</a:t>
+              <a:t>2/6/2023</a:t>
             </a:fld>
             <a:endParaRPr lang="en-US"/>
           </a:p>
@@ -2048,7 +2049,7 @@
           <a:p>
             <a:fld id="{6F3343BF-7104-41BB-9DE2-F81E2A7FAF60}" type="datetimeFigureOut">
               <a:rPr lang="en-US" smtClean="0"/>
-              <a:t>2/22/2021</a:t>
+              <a:t>2/6/2023</a:t>
             </a:fld>
             <a:endParaRPr lang="en-US"/>
           </a:p>
@@ -2460,7 +2461,7 @@
           <a:p>
             <a:fld id="{6F3343BF-7104-41BB-9DE2-F81E2A7FAF60}" type="datetimeFigureOut">
               <a:rPr lang="en-US" smtClean="0"/>
-              <a:t>2/22/2021</a:t>
+              <a:t>2/6/2023</a:t>
             </a:fld>
             <a:endParaRPr lang="en-US"/>
           </a:p>
@@ -2601,7 +2602,7 @@
           <a:p>
             <a:fld id="{6F3343BF-7104-41BB-9DE2-F81E2A7FAF60}" type="datetimeFigureOut">
               <a:rPr lang="en-US" smtClean="0"/>
-              <a:t>2/22/2021</a:t>
+              <a:t>2/6/2023</a:t>
             </a:fld>
             <a:endParaRPr lang="en-US"/>
           </a:p>
@@ -2714,7 +2715,7 @@
           <a:p>
             <a:fld id="{6F3343BF-7104-41BB-9DE2-F81E2A7FAF60}" type="datetimeFigureOut">
               <a:rPr lang="en-US" smtClean="0"/>
-              <a:t>2/22/2021</a:t>
+              <a:t>2/6/2023</a:t>
             </a:fld>
             <a:endParaRPr lang="en-US"/>
           </a:p>
@@ -3025,7 +3026,7 @@
           <a:p>
             <a:fld id="{6F3343BF-7104-41BB-9DE2-F81E2A7FAF60}" type="datetimeFigureOut">
               <a:rPr lang="en-US" smtClean="0"/>
-              <a:t>2/22/2021</a:t>
+              <a:t>2/6/2023</a:t>
             </a:fld>
             <a:endParaRPr lang="en-US"/>
           </a:p>
@@ -3316,7 +3317,7 @@
           <a:p>
             <a:fld id="{6F3343BF-7104-41BB-9DE2-F81E2A7FAF60}" type="datetimeFigureOut">
               <a:rPr lang="en-US" smtClean="0"/>
-              <a:t>2/22/2021</a:t>
+              <a:t>2/6/2023</a:t>
             </a:fld>
             <a:endParaRPr lang="en-US"/>
           </a:p>
@@ -3562,7 +3563,7 @@
           <a:p>
             <a:fld id="{6F3343BF-7104-41BB-9DE2-F81E2A7FAF60}" type="datetimeFigureOut">
               <a:rPr lang="en-US" smtClean="0"/>
-              <a:t>2/22/2021</a:t>
+              <a:t>2/6/2023</a:t>
             </a:fld>
             <a:endParaRPr lang="en-US"/>
           </a:p>
@@ -3996,7 +3997,7 @@
           <p:nvPr>
             <p:extLst>
               <p:ext uri="{D42A27DB-BD31-4B8C-83A1-F6EECF244321}">
-                <p14:modId xmlns:p14="http://schemas.microsoft.com/office/powerpoint/2010/main" val="3162639202"/>
+                <p14:modId xmlns:p14="http://schemas.microsoft.com/office/powerpoint/2010/main" val="2793402764"/>
               </p:ext>
             </p:extLst>
           </p:nvPr>
@@ -4148,7 +4149,7 @@
                           </a:solidFill>
                           <a:effectLst/>
                         </a:rPr>
-                        <a:t>Exception taken from CPU states ...</a:t>
+                        <a:t>Exception occurred in CPU mode ...</a:t>
                       </a:r>
                     </a:p>
                   </a:txBody>
@@ -4299,7 +4300,7 @@
                           </a:solidFill>
                           <a:effectLst/>
                         </a:rPr>
-                        <a:t>(Current EL with SP0)</a:t>
+                        <a:t>(EL1, using SP_EL0)</a:t>
                       </a:r>
                     </a:p>
                   </a:txBody>
@@ -4813,22 +4814,13 @@
                     <a:p>
                       <a:pPr fontAlgn="ctr"/>
                       <a:r>
-                        <a:rPr lang="en-US" sz="1200" b="0" dirty="0">
+                        <a:rPr lang="en-US" sz="1200" b="0">
                           <a:solidFill>
                             <a:srgbClr val="333E48"/>
                           </a:solidFill>
                           <a:effectLst/>
                         </a:rPr>
-                        <a:t>(Current EL with </a:t>
-                      </a:r>
-                      <a:r>
-                        <a:rPr lang="en-US" sz="1200" b="0" dirty="0" err="1">
-                          <a:solidFill>
-                            <a:srgbClr val="333E48"/>
-                          </a:solidFill>
-                          <a:effectLst/>
-                        </a:rPr>
-                        <a:t>SPx</a:t>
+                        <a:t>(EL1, using </a:t>
                       </a:r>
                       <a:r>
                         <a:rPr lang="en-US" sz="1200" b="0" dirty="0">
@@ -4837,7 +4829,7 @@
                           </a:solidFill>
                           <a:effectLst/>
                         </a:rPr>
-                        <a:t>)</a:t>
+                        <a:t>SP_EL1)</a:t>
                       </a:r>
                     </a:p>
                   </a:txBody>
@@ -5357,7 +5349,7 @@
                           </a:solidFill>
                           <a:effectLst/>
                         </a:rPr>
-                        <a:t>(Lower EL using AArch64)</a:t>
+                        <a:t>(EL0, 64bit mode)</a:t>
                       </a:r>
                     </a:p>
                   </a:txBody>
@@ -5839,7 +5831,7 @@
                           </a:solidFill>
                           <a:effectLst/>
                         </a:rPr>
-                        <a:t>(Lower EL using AArch32)</a:t>
+                        <a:t>(EL0, 32bit mode)</a:t>
                       </a:r>
                     </a:p>
                   </a:txBody>
@@ -6699,6 +6691,2751 @@
     </p:spTree>
     <p:extLst>
       <p:ext uri="{BB962C8B-B14F-4D97-AF65-F5344CB8AC3E}">
+        <p14:creationId xmlns:p14="http://schemas.microsoft.com/office/powerpoint/2010/main" val="870018499"/>
+      </p:ext>
+    </p:extLst>
+  </p:cSld>
+  <p:clrMapOvr>
+    <a:masterClrMapping/>
+  </p:clrMapOvr>
+</p:sld>
+</file>
+
+<file path=ppt/slides/slide2.xml><?xml version="1.0" encoding="utf-8"?>
+<p:sld xmlns:a="http://schemas.openxmlformats.org/drawingml/2006/main" xmlns:r="http://schemas.openxmlformats.org/officeDocument/2006/relationships" xmlns:p="http://schemas.openxmlformats.org/presentationml/2006/main">
+  <p:cSld>
+    <p:spTree>
+      <p:nvGrpSpPr>
+        <p:cNvPr id="1" name=""/>
+        <p:cNvGrpSpPr/>
+        <p:nvPr/>
+      </p:nvGrpSpPr>
+      <p:grpSpPr>
+        <a:xfrm>
+          <a:off x="0" y="0"/>
+          <a:ext cx="0" cy="0"/>
+          <a:chOff x="0" y="0"/>
+          <a:chExt cx="0" cy="0"/>
+        </a:xfrm>
+      </p:grpSpPr>
+      <p:graphicFrame>
+        <p:nvGraphicFramePr>
+          <p:cNvPr id="4" name="Table 3">
+            <a:extLst>
+              <a:ext uri="{FF2B5EF4-FFF2-40B4-BE49-F238E27FC236}">
+                <a16:creationId xmlns:a16="http://schemas.microsoft.com/office/drawing/2014/main" id="{ED967E29-51E9-46D7-8F87-C65F54F144DF}"/>
+              </a:ext>
+            </a:extLst>
+          </p:cNvPr>
+          <p:cNvGraphicFramePr>
+            <a:graphicFrameLocks noGrp="1"/>
+          </p:cNvGraphicFramePr>
+          <p:nvPr>
+            <p:extLst>
+              <p:ext uri="{D42A27DB-BD31-4B8C-83A1-F6EECF244321}">
+                <p14:modId xmlns:p14="http://schemas.microsoft.com/office/powerpoint/2010/main" val="3162639202"/>
+              </p:ext>
+            </p:extLst>
+          </p:nvPr>
+        </p:nvGraphicFramePr>
+        <p:xfrm>
+          <a:off x="1767839" y="761364"/>
+          <a:ext cx="5658197" cy="6015848"/>
+        </p:xfrm>
+        <a:graphic>
+          <a:graphicData uri="http://schemas.openxmlformats.org/drawingml/2006/table">
+            <a:tbl>
+              <a:tblPr/>
+              <a:tblGrid>
+                <a:gridCol w="1367081">
+                  <a:extLst>
+                    <a:ext uri="{9D8B030D-6E8A-4147-A177-3AD203B41FA5}">
+                      <a16:colId xmlns:a16="http://schemas.microsoft.com/office/drawing/2014/main" val="1429710536"/>
+                    </a:ext>
+                  </a:extLst>
+                </a:gridCol>
+                <a:gridCol w="2094675">
+                  <a:extLst>
+                    <a:ext uri="{9D8B030D-6E8A-4147-A177-3AD203B41FA5}">
+                      <a16:colId xmlns:a16="http://schemas.microsoft.com/office/drawing/2014/main" val="2024820908"/>
+                    </a:ext>
+                  </a:extLst>
+                </a:gridCol>
+                <a:gridCol w="2196441">
+                  <a:extLst>
+                    <a:ext uri="{9D8B030D-6E8A-4147-A177-3AD203B41FA5}">
+                      <a16:colId xmlns:a16="http://schemas.microsoft.com/office/drawing/2014/main" val="3592006126"/>
+                    </a:ext>
+                  </a:extLst>
+                </a:gridCol>
+              </a:tblGrid>
+              <a:tr h="344311">
+                <a:tc>
+                  <a:txBody>
+                    <a:bodyPr/>
+                    <a:lstStyle/>
+                    <a:p>
+                      <a:pPr fontAlgn="ctr"/>
+                      <a:r>
+                        <a:rPr lang="en-US" sz="1200" b="0" i="1" dirty="0">
+                          <a:solidFill>
+                            <a:schemeClr val="bg1">
+                              <a:lumMod val="75000"/>
+                            </a:schemeClr>
+                          </a:solidFill>
+                          <a:effectLst/>
+                        </a:rPr>
+                        <a:t>Size (bytes)</a:t>
+                      </a:r>
+                    </a:p>
+                  </a:txBody>
+                  <a:tcPr marL="112889" marR="112889" marT="70556" marB="70556" anchor="ctr">
+                    <a:lnL>
+                      <a:noFill/>
+                    </a:lnL>
+                    <a:lnR>
+                      <a:noFill/>
+                    </a:lnR>
+                    <a:lnT w="9525" cap="flat" cmpd="sng" algn="ctr">
+                      <a:solidFill>
+                        <a:srgbClr val="E5ECEB"/>
+                      </a:solidFill>
+                      <a:prstDash val="solid"/>
+                      <a:round/>
+                      <a:headEnd type="none" w="med" len="med"/>
+                      <a:tailEnd type="none" w="med" len="med"/>
+                    </a:lnT>
+                    <a:lnB w="9525" cap="flat" cmpd="sng" algn="ctr">
+                      <a:solidFill>
+                        <a:srgbClr val="E5ECEB"/>
+                      </a:solidFill>
+                      <a:prstDash val="solid"/>
+                      <a:round/>
+                      <a:headEnd type="none" w="med" len="med"/>
+                      <a:tailEnd type="none" w="med" len="med"/>
+                    </a:lnB>
+                  </a:tcPr>
+                </a:tc>
+                <a:tc>
+                  <a:txBody>
+                    <a:bodyPr/>
+                    <a:lstStyle/>
+                    <a:p>
+                      <a:pPr fontAlgn="ctr"/>
+                      <a:r>
+                        <a:rPr lang="en-US" sz="1200" b="1" i="1" dirty="0">
+                          <a:solidFill>
+                            <a:schemeClr val="bg1">
+                              <a:lumMod val="75000"/>
+                            </a:schemeClr>
+                          </a:solidFill>
+                          <a:effectLst/>
+                        </a:rPr>
+                        <a:t>Exception types</a:t>
+                      </a:r>
+                      <a:endParaRPr lang="en-US" sz="1200" b="0" i="1" dirty="0">
+                        <a:solidFill>
+                          <a:schemeClr val="bg1">
+                            <a:lumMod val="75000"/>
+                          </a:schemeClr>
+                        </a:solidFill>
+                        <a:effectLst/>
+                      </a:endParaRPr>
+                    </a:p>
+                  </a:txBody>
+                  <a:tcPr marL="112889" marR="112889" marT="70556" marB="70556" anchor="ctr">
+                    <a:lnL>
+                      <a:noFill/>
+                    </a:lnL>
+                    <a:lnR>
+                      <a:noFill/>
+                    </a:lnR>
+                    <a:lnT w="9525" cap="flat" cmpd="sng" algn="ctr">
+                      <a:solidFill>
+                        <a:srgbClr val="E5ECEB"/>
+                      </a:solidFill>
+                      <a:prstDash val="solid"/>
+                      <a:round/>
+                      <a:headEnd type="none" w="med" len="med"/>
+                      <a:tailEnd type="none" w="med" len="med"/>
+                    </a:lnT>
+                    <a:lnB w="9525" cap="flat" cmpd="sng" algn="ctr">
+                      <a:solidFill>
+                        <a:srgbClr val="E5ECEB"/>
+                      </a:solidFill>
+                      <a:prstDash val="solid"/>
+                      <a:round/>
+                      <a:headEnd type="none" w="med" len="med"/>
+                      <a:tailEnd type="none" w="med" len="med"/>
+                    </a:lnB>
+                  </a:tcPr>
+                </a:tc>
+                <a:tc>
+                  <a:txBody>
+                    <a:bodyPr/>
+                    <a:lstStyle/>
+                    <a:p>
+                      <a:pPr fontAlgn="ctr"/>
+                      <a:r>
+                        <a:rPr lang="en-US" sz="1200" b="0" i="1" dirty="0">
+                          <a:solidFill>
+                            <a:schemeClr val="bg1">
+                              <a:lumMod val="75000"/>
+                            </a:schemeClr>
+                          </a:solidFill>
+                          <a:effectLst/>
+                        </a:rPr>
+                        <a:t>Exception taken from CPU states ...</a:t>
+                      </a:r>
+                    </a:p>
+                  </a:txBody>
+                  <a:tcPr marL="112889" marR="112889" marT="70556" marB="70556" anchor="ctr">
+                    <a:lnL>
+                      <a:noFill/>
+                    </a:lnL>
+                    <a:lnR>
+                      <a:noFill/>
+                    </a:lnR>
+                    <a:lnT w="9525" cap="flat" cmpd="sng" algn="ctr">
+                      <a:solidFill>
+                        <a:srgbClr val="E5ECEB"/>
+                      </a:solidFill>
+                      <a:prstDash val="solid"/>
+                      <a:round/>
+                      <a:headEnd type="none" w="med" len="med"/>
+                      <a:tailEnd type="none" w="med" len="med"/>
+                    </a:lnT>
+                    <a:lnB w="9525" cap="flat" cmpd="sng" algn="ctr">
+                      <a:solidFill>
+                        <a:srgbClr val="E5ECEB"/>
+                      </a:solidFill>
+                      <a:prstDash val="solid"/>
+                      <a:round/>
+                      <a:headEnd type="none" w="med" len="med"/>
+                      <a:tailEnd type="none" w="med" len="med"/>
+                    </a:lnB>
+                  </a:tcPr>
+                </a:tc>
+                <a:extLst>
+                  <a:ext uri="{0D108BD9-81ED-4DB2-BD59-A6C34878D82A}">
+                    <a16:rowId xmlns:a16="http://schemas.microsoft.com/office/drawing/2014/main" val="4119629353"/>
+                  </a:ext>
+                </a:extLst>
+              </a:tr>
+              <a:tr h="344311">
+                <a:tc>
+                  <a:txBody>
+                    <a:bodyPr/>
+                    <a:lstStyle/>
+                    <a:p>
+                      <a:pPr fontAlgn="ctr"/>
+                      <a:r>
+                        <a:rPr lang="en-US" sz="1200" b="0" dirty="0">
+                          <a:solidFill>
+                            <a:srgbClr val="333E48"/>
+                          </a:solidFill>
+                          <a:effectLst/>
+                        </a:rPr>
+                        <a:t>128 (0x80)</a:t>
+                      </a:r>
+                    </a:p>
+                  </a:txBody>
+                  <a:tcPr marL="112889" marR="112889" marT="70556" marB="70556" anchor="ctr">
+                    <a:lnL>
+                      <a:noFill/>
+                    </a:lnL>
+                    <a:lnR>
+                      <a:noFill/>
+                    </a:lnR>
+                    <a:lnT w="9525" cap="flat" cmpd="sng" algn="ctr">
+                      <a:solidFill>
+                        <a:srgbClr val="E5ECEB"/>
+                      </a:solidFill>
+                      <a:prstDash val="solid"/>
+                      <a:round/>
+                      <a:headEnd type="none" w="med" len="med"/>
+                      <a:tailEnd type="none" w="med" len="med"/>
+                    </a:lnT>
+                    <a:lnB w="9525" cap="flat" cmpd="sng" algn="ctr">
+                      <a:solidFill>
+                        <a:srgbClr val="E5ECEB"/>
+                      </a:solidFill>
+                      <a:prstDash val="solid"/>
+                      <a:round/>
+                      <a:headEnd type="none" w="med" len="med"/>
+                      <a:tailEnd type="none" w="med" len="med"/>
+                    </a:lnB>
+                  </a:tcPr>
+                </a:tc>
+                <a:tc>
+                  <a:txBody>
+                    <a:bodyPr/>
+                    <a:lstStyle/>
+                    <a:p>
+                      <a:pPr fontAlgn="ctr"/>
+                      <a:r>
+                        <a:rPr lang="en-US" sz="1200" b="0" dirty="0">
+                          <a:solidFill>
+                            <a:srgbClr val="333E48"/>
+                          </a:solidFill>
+                          <a:effectLst/>
+                        </a:rPr>
+                        <a:t>Synchronous</a:t>
+                      </a:r>
+                    </a:p>
+                  </a:txBody>
+                  <a:tcPr marL="112889" marR="112889" marT="70556" marB="70556" anchor="ctr">
+                    <a:lnL>
+                      <a:noFill/>
+                    </a:lnL>
+                    <a:lnR>
+                      <a:noFill/>
+                    </a:lnR>
+                    <a:lnT w="9525" cap="flat" cmpd="sng" algn="ctr">
+                      <a:solidFill>
+                        <a:srgbClr val="E5ECEB"/>
+                      </a:solidFill>
+                      <a:prstDash val="solid"/>
+                      <a:round/>
+                      <a:headEnd type="none" w="med" len="med"/>
+                      <a:tailEnd type="none" w="med" len="med"/>
+                    </a:lnT>
+                    <a:lnB w="9525" cap="flat" cmpd="sng" algn="ctr">
+                      <a:solidFill>
+                        <a:srgbClr val="E5ECEB"/>
+                      </a:solidFill>
+                      <a:prstDash val="solid"/>
+                      <a:round/>
+                      <a:headEnd type="none" w="med" len="med"/>
+                      <a:tailEnd type="none" w="med" len="med"/>
+                    </a:lnB>
+                  </a:tcPr>
+                </a:tc>
+                <a:tc rowSpan="4">
+                  <a:txBody>
+                    <a:bodyPr/>
+                    <a:lstStyle/>
+                    <a:p>
+                      <a:pPr fontAlgn="ctr"/>
+                      <a:r>
+                        <a:rPr lang="en-US" sz="1200" b="0" dirty="0">
+                          <a:solidFill>
+                            <a:srgbClr val="333E48"/>
+                          </a:solidFill>
+                          <a:effectLst/>
+                        </a:rPr>
+                        <a:t>EL1t</a:t>
+                      </a:r>
+                    </a:p>
+                    <a:p>
+                      <a:pPr fontAlgn="ctr"/>
+                      <a:r>
+                        <a:rPr lang="en-US" sz="1200" b="0" dirty="0">
+                          <a:solidFill>
+                            <a:srgbClr val="333E48"/>
+                          </a:solidFill>
+                          <a:effectLst/>
+                        </a:rPr>
+                        <a:t>(Current EL with SP0)</a:t>
+                      </a:r>
+                    </a:p>
+                  </a:txBody>
+                  <a:tcPr marL="112889" marR="112889" marT="70556" marB="70556" anchor="ctr">
+                    <a:lnL>
+                      <a:noFill/>
+                    </a:lnL>
+                    <a:lnR>
+                      <a:noFill/>
+                    </a:lnR>
+                    <a:lnT w="9525" cap="flat" cmpd="sng" algn="ctr">
+                      <a:solidFill>
+                        <a:srgbClr val="E5ECEB"/>
+                      </a:solidFill>
+                      <a:prstDash val="solid"/>
+                      <a:round/>
+                      <a:headEnd type="none" w="med" len="med"/>
+                      <a:tailEnd type="none" w="med" len="med"/>
+                    </a:lnT>
+                    <a:lnB w="9525" cap="flat" cmpd="sng" algn="ctr">
+                      <a:solidFill>
+                        <a:srgbClr val="E5ECEB"/>
+                      </a:solidFill>
+                      <a:prstDash val="solid"/>
+                      <a:round/>
+                      <a:headEnd type="none" w="med" len="med"/>
+                      <a:tailEnd type="none" w="med" len="med"/>
+                    </a:lnB>
+                  </a:tcPr>
+                </a:tc>
+                <a:extLst>
+                  <a:ext uri="{0D108BD9-81ED-4DB2-BD59-A6C34878D82A}">
+                    <a16:rowId xmlns:a16="http://schemas.microsoft.com/office/drawing/2014/main" val="3873799619"/>
+                  </a:ext>
+                </a:extLst>
+              </a:tr>
+              <a:tr h="344311">
+                <a:tc>
+                  <a:txBody>
+                    <a:bodyPr/>
+                    <a:lstStyle/>
+                    <a:p>
+                      <a:pPr fontAlgn="ctr"/>
+                      <a:r>
+                        <a:rPr lang="en-US" sz="1200" b="0" dirty="0">
+                          <a:solidFill>
+                            <a:srgbClr val="333E48"/>
+                          </a:solidFill>
+                          <a:effectLst/>
+                        </a:rPr>
+                        <a:t>128 (0x80)</a:t>
+                      </a:r>
+                    </a:p>
+                  </a:txBody>
+                  <a:tcPr marL="112889" marR="112889" marT="70556" marB="70556" anchor="ctr">
+                    <a:lnL>
+                      <a:noFill/>
+                    </a:lnL>
+                    <a:lnR>
+                      <a:noFill/>
+                    </a:lnR>
+                    <a:lnT w="9525" cap="flat" cmpd="sng" algn="ctr">
+                      <a:solidFill>
+                        <a:srgbClr val="E5ECEB"/>
+                      </a:solidFill>
+                      <a:prstDash val="solid"/>
+                      <a:round/>
+                      <a:headEnd type="none" w="med" len="med"/>
+                      <a:tailEnd type="none" w="med" len="med"/>
+                    </a:lnT>
+                    <a:lnB w="9525" cap="flat" cmpd="sng" algn="ctr">
+                      <a:solidFill>
+                        <a:srgbClr val="E5ECEB"/>
+                      </a:solidFill>
+                      <a:prstDash val="solid"/>
+                      <a:round/>
+                      <a:headEnd type="none" w="med" len="med"/>
+                      <a:tailEnd type="none" w="med" len="med"/>
+                    </a:lnB>
+                  </a:tcPr>
+                </a:tc>
+                <a:tc>
+                  <a:txBody>
+                    <a:bodyPr/>
+                    <a:lstStyle/>
+                    <a:p>
+                      <a:pPr fontAlgn="ctr"/>
+                      <a:r>
+                        <a:rPr lang="en-US" sz="1200" b="0" dirty="0">
+                          <a:solidFill>
+                            <a:srgbClr val="333E48"/>
+                          </a:solidFill>
+                          <a:effectLst/>
+                        </a:rPr>
+                        <a:t>IRQ/</a:t>
+                      </a:r>
+                      <a:r>
+                        <a:rPr lang="en-US" sz="1200" b="0" dirty="0" err="1">
+                          <a:solidFill>
+                            <a:srgbClr val="333E48"/>
+                          </a:solidFill>
+                          <a:effectLst/>
+                        </a:rPr>
+                        <a:t>vIRQ</a:t>
+                      </a:r>
+                      <a:endParaRPr lang="en-US" sz="1200" b="0" dirty="0">
+                        <a:solidFill>
+                          <a:srgbClr val="333E48"/>
+                        </a:solidFill>
+                        <a:effectLst/>
+                      </a:endParaRPr>
+                    </a:p>
+                  </a:txBody>
+                  <a:tcPr marL="112889" marR="112889" marT="70556" marB="70556" anchor="ctr">
+                    <a:lnL>
+                      <a:noFill/>
+                    </a:lnL>
+                    <a:lnR>
+                      <a:noFill/>
+                    </a:lnR>
+                    <a:lnT w="9525" cap="flat" cmpd="sng" algn="ctr">
+                      <a:solidFill>
+                        <a:srgbClr val="E5ECEB"/>
+                      </a:solidFill>
+                      <a:prstDash val="solid"/>
+                      <a:round/>
+                      <a:headEnd type="none" w="med" len="med"/>
+                      <a:tailEnd type="none" w="med" len="med"/>
+                    </a:lnT>
+                    <a:lnB w="9525" cap="flat" cmpd="sng" algn="ctr">
+                      <a:solidFill>
+                        <a:srgbClr val="E5ECEB"/>
+                      </a:solidFill>
+                      <a:prstDash val="solid"/>
+                      <a:round/>
+                      <a:headEnd type="none" w="med" len="med"/>
+                      <a:tailEnd type="none" w="med" len="med"/>
+                    </a:lnB>
+                  </a:tcPr>
+                </a:tc>
+                <a:tc vMerge="1">
+                  <a:txBody>
+                    <a:bodyPr/>
+                    <a:lstStyle/>
+                    <a:p>
+                      <a:endParaRPr lang="en-US"/>
+                    </a:p>
+                  </a:txBody>
+                  <a:tcPr/>
+                </a:tc>
+                <a:extLst>
+                  <a:ext uri="{0D108BD9-81ED-4DB2-BD59-A6C34878D82A}">
+                    <a16:rowId xmlns:a16="http://schemas.microsoft.com/office/drawing/2014/main" val="1539129261"/>
+                  </a:ext>
+                </a:extLst>
+              </a:tr>
+              <a:tr h="344311">
+                <a:tc>
+                  <a:txBody>
+                    <a:bodyPr/>
+                    <a:lstStyle/>
+                    <a:p>
+                      <a:pPr fontAlgn="ctr"/>
+                      <a:r>
+                        <a:rPr lang="en-US" sz="1200" b="0" dirty="0">
+                          <a:solidFill>
+                            <a:srgbClr val="333E48"/>
+                          </a:solidFill>
+                          <a:effectLst/>
+                        </a:rPr>
+                        <a:t>128 (0x80)</a:t>
+                      </a:r>
+                    </a:p>
+                  </a:txBody>
+                  <a:tcPr marL="112889" marR="112889" marT="70556" marB="70556" anchor="ctr">
+                    <a:lnL>
+                      <a:noFill/>
+                    </a:lnL>
+                    <a:lnR>
+                      <a:noFill/>
+                    </a:lnR>
+                    <a:lnT w="9525" cap="flat" cmpd="sng" algn="ctr">
+                      <a:solidFill>
+                        <a:srgbClr val="E5ECEB"/>
+                      </a:solidFill>
+                      <a:prstDash val="solid"/>
+                      <a:round/>
+                      <a:headEnd type="none" w="med" len="med"/>
+                      <a:tailEnd type="none" w="med" len="med"/>
+                    </a:lnT>
+                    <a:lnB w="9525" cap="flat" cmpd="sng" algn="ctr">
+                      <a:solidFill>
+                        <a:srgbClr val="E5ECEB"/>
+                      </a:solidFill>
+                      <a:prstDash val="solid"/>
+                      <a:round/>
+                      <a:headEnd type="none" w="med" len="med"/>
+                      <a:tailEnd type="none" w="med" len="med"/>
+                    </a:lnB>
+                  </a:tcPr>
+                </a:tc>
+                <a:tc>
+                  <a:txBody>
+                    <a:bodyPr/>
+                    <a:lstStyle/>
+                    <a:p>
+                      <a:pPr fontAlgn="ctr"/>
+                      <a:r>
+                        <a:rPr lang="en-US" sz="1200" b="0" dirty="0">
+                          <a:solidFill>
+                            <a:srgbClr val="333E48"/>
+                          </a:solidFill>
+                          <a:effectLst/>
+                        </a:rPr>
+                        <a:t>FIQ/</a:t>
+                      </a:r>
+                      <a:r>
+                        <a:rPr lang="en-US" sz="1200" b="0" dirty="0" err="1">
+                          <a:solidFill>
+                            <a:srgbClr val="333E48"/>
+                          </a:solidFill>
+                          <a:effectLst/>
+                        </a:rPr>
+                        <a:t>vFIQ</a:t>
+                      </a:r>
+                      <a:endParaRPr lang="en-US" sz="1200" b="0" dirty="0">
+                        <a:solidFill>
+                          <a:srgbClr val="333E48"/>
+                        </a:solidFill>
+                        <a:effectLst/>
+                      </a:endParaRPr>
+                    </a:p>
+                  </a:txBody>
+                  <a:tcPr marL="112889" marR="112889" marT="70556" marB="70556" anchor="ctr">
+                    <a:lnL>
+                      <a:noFill/>
+                    </a:lnL>
+                    <a:lnR>
+                      <a:noFill/>
+                    </a:lnR>
+                    <a:lnT w="9525" cap="flat" cmpd="sng" algn="ctr">
+                      <a:solidFill>
+                        <a:srgbClr val="E5ECEB"/>
+                      </a:solidFill>
+                      <a:prstDash val="solid"/>
+                      <a:round/>
+                      <a:headEnd type="none" w="med" len="med"/>
+                      <a:tailEnd type="none" w="med" len="med"/>
+                    </a:lnT>
+                    <a:lnB w="9525" cap="flat" cmpd="sng" algn="ctr">
+                      <a:solidFill>
+                        <a:srgbClr val="E5ECEB"/>
+                      </a:solidFill>
+                      <a:prstDash val="solid"/>
+                      <a:round/>
+                      <a:headEnd type="none" w="med" len="med"/>
+                      <a:tailEnd type="none" w="med" len="med"/>
+                    </a:lnB>
+                  </a:tcPr>
+                </a:tc>
+                <a:tc vMerge="1">
+                  <a:txBody>
+                    <a:bodyPr/>
+                    <a:lstStyle/>
+                    <a:p>
+                      <a:endParaRPr lang="en-US"/>
+                    </a:p>
+                  </a:txBody>
+                  <a:tcPr/>
+                </a:tc>
+                <a:extLst>
+                  <a:ext uri="{0D108BD9-81ED-4DB2-BD59-A6C34878D82A}">
+                    <a16:rowId xmlns:a16="http://schemas.microsoft.com/office/drawing/2014/main" val="1531932084"/>
+                  </a:ext>
+                </a:extLst>
+              </a:tr>
+              <a:tr h="344311">
+                <a:tc>
+                  <a:txBody>
+                    <a:bodyPr/>
+                    <a:lstStyle/>
+                    <a:p>
+                      <a:pPr fontAlgn="ctr"/>
+                      <a:r>
+                        <a:rPr lang="en-US" sz="1200" b="0" dirty="0">
+                          <a:solidFill>
+                            <a:srgbClr val="333E48"/>
+                          </a:solidFill>
+                          <a:effectLst/>
+                        </a:rPr>
+                        <a:t>128 (0x80)</a:t>
+                      </a:r>
+                    </a:p>
+                  </a:txBody>
+                  <a:tcPr marL="112889" marR="112889" marT="70556" marB="70556" anchor="ctr">
+                    <a:lnL>
+                      <a:noFill/>
+                    </a:lnL>
+                    <a:lnR>
+                      <a:noFill/>
+                    </a:lnR>
+                    <a:lnT w="9525" cap="flat" cmpd="sng" algn="ctr">
+                      <a:solidFill>
+                        <a:srgbClr val="E5ECEB"/>
+                      </a:solidFill>
+                      <a:prstDash val="solid"/>
+                      <a:round/>
+                      <a:headEnd type="none" w="med" len="med"/>
+                      <a:tailEnd type="none" w="med" len="med"/>
+                    </a:lnT>
+                    <a:lnB w="9525" cap="flat" cmpd="sng" algn="ctr">
+                      <a:solidFill>
+                        <a:srgbClr val="E5ECEB"/>
+                      </a:solidFill>
+                      <a:prstDash val="solid"/>
+                      <a:round/>
+                      <a:headEnd type="none" w="med" len="med"/>
+                      <a:tailEnd type="none" w="med" len="med"/>
+                    </a:lnB>
+                  </a:tcPr>
+                </a:tc>
+                <a:tc>
+                  <a:txBody>
+                    <a:bodyPr/>
+                    <a:lstStyle/>
+                    <a:p>
+                      <a:pPr fontAlgn="ctr"/>
+                      <a:r>
+                        <a:rPr lang="en-US" sz="1200" b="0" dirty="0" err="1">
+                          <a:solidFill>
+                            <a:srgbClr val="333E48"/>
+                          </a:solidFill>
+                          <a:effectLst/>
+                        </a:rPr>
+                        <a:t>SError</a:t>
+                      </a:r>
+                      <a:r>
+                        <a:rPr lang="en-US" sz="1200" b="0" dirty="0">
+                          <a:solidFill>
+                            <a:srgbClr val="333E48"/>
+                          </a:solidFill>
+                          <a:effectLst/>
+                        </a:rPr>
+                        <a:t>/</a:t>
+                      </a:r>
+                      <a:r>
+                        <a:rPr lang="en-US" sz="1200" b="0" dirty="0" err="1">
+                          <a:solidFill>
+                            <a:srgbClr val="333E48"/>
+                          </a:solidFill>
+                          <a:effectLst/>
+                        </a:rPr>
+                        <a:t>vSError</a:t>
+                      </a:r>
+                      <a:endParaRPr lang="en-US" sz="1200" b="0" dirty="0">
+                        <a:solidFill>
+                          <a:srgbClr val="333E48"/>
+                        </a:solidFill>
+                        <a:effectLst/>
+                      </a:endParaRPr>
+                    </a:p>
+                  </a:txBody>
+                  <a:tcPr marL="112889" marR="112889" marT="70556" marB="70556" anchor="ctr">
+                    <a:lnL>
+                      <a:noFill/>
+                    </a:lnL>
+                    <a:lnR>
+                      <a:noFill/>
+                    </a:lnR>
+                    <a:lnT w="9525" cap="flat" cmpd="sng" algn="ctr">
+                      <a:solidFill>
+                        <a:srgbClr val="E5ECEB"/>
+                      </a:solidFill>
+                      <a:prstDash val="solid"/>
+                      <a:round/>
+                      <a:headEnd type="none" w="med" len="med"/>
+                      <a:tailEnd type="none" w="med" len="med"/>
+                    </a:lnT>
+                    <a:lnB w="9525" cap="flat" cmpd="sng" algn="ctr">
+                      <a:solidFill>
+                        <a:srgbClr val="E5ECEB"/>
+                      </a:solidFill>
+                      <a:prstDash val="solid"/>
+                      <a:round/>
+                      <a:headEnd type="none" w="med" len="med"/>
+                      <a:tailEnd type="none" w="med" len="med"/>
+                    </a:lnB>
+                  </a:tcPr>
+                </a:tc>
+                <a:tc vMerge="1">
+                  <a:txBody>
+                    <a:bodyPr/>
+                    <a:lstStyle/>
+                    <a:p>
+                      <a:endParaRPr lang="en-US"/>
+                    </a:p>
+                  </a:txBody>
+                  <a:tcPr/>
+                </a:tc>
+                <a:extLst>
+                  <a:ext uri="{0D108BD9-81ED-4DB2-BD59-A6C34878D82A}">
+                    <a16:rowId xmlns:a16="http://schemas.microsoft.com/office/drawing/2014/main" val="832726633"/>
+                  </a:ext>
+                </a:extLst>
+              </a:tr>
+              <a:tr h="344311">
+                <a:tc>
+                  <a:txBody>
+                    <a:bodyPr/>
+                    <a:lstStyle/>
+                    <a:p>
+                      <a:pPr fontAlgn="ctr"/>
+                      <a:r>
+                        <a:rPr lang="en-US" sz="1200" b="0" dirty="0">
+                          <a:solidFill>
+                            <a:srgbClr val="333E48"/>
+                          </a:solidFill>
+                          <a:effectLst/>
+                        </a:rPr>
+                        <a:t>128 (0x80)</a:t>
+                      </a:r>
+                    </a:p>
+                  </a:txBody>
+                  <a:tcPr marL="112889" marR="112889" marT="70556" marB="70556" anchor="ctr">
+                    <a:lnL>
+                      <a:noFill/>
+                    </a:lnL>
+                    <a:lnR>
+                      <a:noFill/>
+                    </a:lnR>
+                    <a:lnT w="9525" cap="flat" cmpd="sng" algn="ctr">
+                      <a:solidFill>
+                        <a:srgbClr val="E5ECEB"/>
+                      </a:solidFill>
+                      <a:prstDash val="solid"/>
+                      <a:round/>
+                      <a:headEnd type="none" w="med" len="med"/>
+                      <a:tailEnd type="none" w="med" len="med"/>
+                    </a:lnT>
+                    <a:lnB w="9525" cap="flat" cmpd="sng" algn="ctr">
+                      <a:solidFill>
+                        <a:srgbClr val="E5ECEB"/>
+                      </a:solidFill>
+                      <a:prstDash val="solid"/>
+                      <a:round/>
+                      <a:headEnd type="none" w="med" len="med"/>
+                      <a:tailEnd type="none" w="med" len="med"/>
+                    </a:lnB>
+                  </a:tcPr>
+                </a:tc>
+                <a:tc>
+                  <a:txBody>
+                    <a:bodyPr/>
+                    <a:lstStyle/>
+                    <a:p>
+                      <a:pPr fontAlgn="ctr"/>
+                      <a:r>
+                        <a:rPr lang="en-US" sz="1200" b="0">
+                          <a:solidFill>
+                            <a:srgbClr val="333E48"/>
+                          </a:solidFill>
+                          <a:effectLst/>
+                        </a:rPr>
+                        <a:t>Synchronous</a:t>
+                      </a:r>
+                    </a:p>
+                  </a:txBody>
+                  <a:tcPr marL="112889" marR="112889" marT="70556" marB="70556" anchor="ctr">
+                    <a:lnL>
+                      <a:noFill/>
+                    </a:lnL>
+                    <a:lnR>
+                      <a:noFill/>
+                    </a:lnR>
+                    <a:lnT w="9525" cap="flat" cmpd="sng" algn="ctr">
+                      <a:solidFill>
+                        <a:srgbClr val="E5ECEB"/>
+                      </a:solidFill>
+                      <a:prstDash val="solid"/>
+                      <a:round/>
+                      <a:headEnd type="none" w="med" len="med"/>
+                      <a:tailEnd type="none" w="med" len="med"/>
+                    </a:lnT>
+                    <a:lnB w="9525" cap="flat" cmpd="sng" algn="ctr">
+                      <a:solidFill>
+                        <a:srgbClr val="E5ECEB"/>
+                      </a:solidFill>
+                      <a:prstDash val="solid"/>
+                      <a:round/>
+                      <a:headEnd type="none" w="med" len="med"/>
+                      <a:tailEnd type="none" w="med" len="med"/>
+                    </a:lnB>
+                  </a:tcPr>
+                </a:tc>
+                <a:tc rowSpan="4">
+                  <a:txBody>
+                    <a:bodyPr/>
+                    <a:lstStyle/>
+                    <a:p>
+                      <a:pPr fontAlgn="ctr"/>
+                      <a:r>
+                        <a:rPr lang="en-US" sz="1200" b="0" dirty="0">
+                          <a:solidFill>
+                            <a:srgbClr val="333E48"/>
+                          </a:solidFill>
+                          <a:effectLst/>
+                        </a:rPr>
+                        <a:t>EL1h</a:t>
+                      </a:r>
+                    </a:p>
+                    <a:p>
+                      <a:pPr fontAlgn="ctr"/>
+                      <a:r>
+                        <a:rPr lang="en-US" sz="1200" b="0" dirty="0">
+                          <a:solidFill>
+                            <a:srgbClr val="333E48"/>
+                          </a:solidFill>
+                          <a:effectLst/>
+                        </a:rPr>
+                        <a:t>(Current EL with </a:t>
+                      </a:r>
+                      <a:r>
+                        <a:rPr lang="en-US" sz="1200" b="0" dirty="0" err="1">
+                          <a:solidFill>
+                            <a:srgbClr val="333E48"/>
+                          </a:solidFill>
+                          <a:effectLst/>
+                        </a:rPr>
+                        <a:t>SPx</a:t>
+                      </a:r>
+                      <a:r>
+                        <a:rPr lang="en-US" sz="1200" b="0" dirty="0">
+                          <a:solidFill>
+                            <a:srgbClr val="333E48"/>
+                          </a:solidFill>
+                          <a:effectLst/>
+                        </a:rPr>
+                        <a:t>)</a:t>
+                      </a:r>
+                    </a:p>
+                  </a:txBody>
+                  <a:tcPr marL="112889" marR="112889" marT="70556" marB="70556" anchor="ctr">
+                    <a:lnL>
+                      <a:noFill/>
+                    </a:lnL>
+                    <a:lnR>
+                      <a:noFill/>
+                    </a:lnR>
+                    <a:lnT w="9525" cap="flat" cmpd="sng" algn="ctr">
+                      <a:solidFill>
+                        <a:srgbClr val="E5ECEB"/>
+                      </a:solidFill>
+                      <a:prstDash val="solid"/>
+                      <a:round/>
+                      <a:headEnd type="none" w="med" len="med"/>
+                      <a:tailEnd type="none" w="med" len="med"/>
+                    </a:lnT>
+                    <a:lnB w="9525" cap="flat" cmpd="sng" algn="ctr">
+                      <a:solidFill>
+                        <a:srgbClr val="E5ECEB"/>
+                      </a:solidFill>
+                      <a:prstDash val="solid"/>
+                      <a:round/>
+                      <a:headEnd type="none" w="med" len="med"/>
+                      <a:tailEnd type="none" w="med" len="med"/>
+                    </a:lnB>
+                  </a:tcPr>
+                </a:tc>
+                <a:extLst>
+                  <a:ext uri="{0D108BD9-81ED-4DB2-BD59-A6C34878D82A}">
+                    <a16:rowId xmlns:a16="http://schemas.microsoft.com/office/drawing/2014/main" val="746351796"/>
+                  </a:ext>
+                </a:extLst>
+              </a:tr>
+              <a:tr h="344311">
+                <a:tc>
+                  <a:txBody>
+                    <a:bodyPr/>
+                    <a:lstStyle/>
+                    <a:p>
+                      <a:pPr fontAlgn="ctr"/>
+                      <a:r>
+                        <a:rPr lang="en-US" sz="1200" b="0" dirty="0">
+                          <a:solidFill>
+                            <a:srgbClr val="333E48"/>
+                          </a:solidFill>
+                          <a:effectLst/>
+                        </a:rPr>
+                        <a:t>128 (0x80)</a:t>
+                      </a:r>
+                    </a:p>
+                  </a:txBody>
+                  <a:tcPr marL="112889" marR="112889" marT="70556" marB="70556" anchor="ctr">
+                    <a:lnL>
+                      <a:noFill/>
+                    </a:lnL>
+                    <a:lnR>
+                      <a:noFill/>
+                    </a:lnR>
+                    <a:lnT w="9525" cap="flat" cmpd="sng" algn="ctr">
+                      <a:solidFill>
+                        <a:srgbClr val="E5ECEB"/>
+                      </a:solidFill>
+                      <a:prstDash val="solid"/>
+                      <a:round/>
+                      <a:headEnd type="none" w="med" len="med"/>
+                      <a:tailEnd type="none" w="med" len="med"/>
+                    </a:lnT>
+                    <a:lnB w="9525" cap="flat" cmpd="sng" algn="ctr">
+                      <a:solidFill>
+                        <a:srgbClr val="E5ECEB"/>
+                      </a:solidFill>
+                      <a:prstDash val="solid"/>
+                      <a:round/>
+                      <a:headEnd type="none" w="med" len="med"/>
+                      <a:tailEnd type="none" w="med" len="med"/>
+                    </a:lnB>
+                  </a:tcPr>
+                </a:tc>
+                <a:tc>
+                  <a:txBody>
+                    <a:bodyPr/>
+                    <a:lstStyle/>
+                    <a:p>
+                      <a:pPr fontAlgn="ctr"/>
+                      <a:r>
+                        <a:rPr lang="en-US" sz="1200" b="0" dirty="0">
+                          <a:solidFill>
+                            <a:srgbClr val="333E48"/>
+                          </a:solidFill>
+                          <a:effectLst/>
+                        </a:rPr>
+                        <a:t>IRQ/</a:t>
+                      </a:r>
+                      <a:r>
+                        <a:rPr lang="en-US" sz="1200" b="0" dirty="0" err="1">
+                          <a:solidFill>
+                            <a:srgbClr val="333E48"/>
+                          </a:solidFill>
+                          <a:effectLst/>
+                        </a:rPr>
+                        <a:t>vIRQ</a:t>
+                      </a:r>
+                      <a:endParaRPr lang="en-US" sz="1200" b="0" dirty="0">
+                        <a:solidFill>
+                          <a:srgbClr val="333E48"/>
+                        </a:solidFill>
+                        <a:effectLst/>
+                      </a:endParaRPr>
+                    </a:p>
+                  </a:txBody>
+                  <a:tcPr marL="112889" marR="112889" marT="70556" marB="70556" anchor="ctr">
+                    <a:lnL>
+                      <a:noFill/>
+                    </a:lnL>
+                    <a:lnR>
+                      <a:noFill/>
+                    </a:lnR>
+                    <a:lnT w="9525" cap="flat" cmpd="sng" algn="ctr">
+                      <a:solidFill>
+                        <a:srgbClr val="E5ECEB"/>
+                      </a:solidFill>
+                      <a:prstDash val="solid"/>
+                      <a:round/>
+                      <a:headEnd type="none" w="med" len="med"/>
+                      <a:tailEnd type="none" w="med" len="med"/>
+                    </a:lnT>
+                    <a:lnB w="9525" cap="flat" cmpd="sng" algn="ctr">
+                      <a:solidFill>
+                        <a:srgbClr val="E5ECEB"/>
+                      </a:solidFill>
+                      <a:prstDash val="solid"/>
+                      <a:round/>
+                      <a:headEnd type="none" w="med" len="med"/>
+                      <a:tailEnd type="none" w="med" len="med"/>
+                    </a:lnB>
+                  </a:tcPr>
+                </a:tc>
+                <a:tc vMerge="1">
+                  <a:txBody>
+                    <a:bodyPr/>
+                    <a:lstStyle/>
+                    <a:p>
+                      <a:endParaRPr lang="en-US"/>
+                    </a:p>
+                  </a:txBody>
+                  <a:tcPr/>
+                </a:tc>
+                <a:extLst>
+                  <a:ext uri="{0D108BD9-81ED-4DB2-BD59-A6C34878D82A}">
+                    <a16:rowId xmlns:a16="http://schemas.microsoft.com/office/drawing/2014/main" val="2796525945"/>
+                  </a:ext>
+                </a:extLst>
+              </a:tr>
+              <a:tr h="344311">
+                <a:tc>
+                  <a:txBody>
+                    <a:bodyPr/>
+                    <a:lstStyle/>
+                    <a:p>
+                      <a:pPr fontAlgn="ctr"/>
+                      <a:r>
+                        <a:rPr lang="en-US" sz="1200" b="0" dirty="0">
+                          <a:solidFill>
+                            <a:srgbClr val="333E48"/>
+                          </a:solidFill>
+                          <a:effectLst/>
+                        </a:rPr>
+                        <a:t>128 (0x80)</a:t>
+                      </a:r>
+                    </a:p>
+                  </a:txBody>
+                  <a:tcPr marL="112889" marR="112889" marT="70556" marB="70556" anchor="ctr">
+                    <a:lnL>
+                      <a:noFill/>
+                    </a:lnL>
+                    <a:lnR>
+                      <a:noFill/>
+                    </a:lnR>
+                    <a:lnT w="9525" cap="flat" cmpd="sng" algn="ctr">
+                      <a:solidFill>
+                        <a:srgbClr val="E5ECEB"/>
+                      </a:solidFill>
+                      <a:prstDash val="solid"/>
+                      <a:round/>
+                      <a:headEnd type="none" w="med" len="med"/>
+                      <a:tailEnd type="none" w="med" len="med"/>
+                    </a:lnT>
+                    <a:lnB w="9525" cap="flat" cmpd="sng" algn="ctr">
+                      <a:solidFill>
+                        <a:srgbClr val="E5ECEB"/>
+                      </a:solidFill>
+                      <a:prstDash val="solid"/>
+                      <a:round/>
+                      <a:headEnd type="none" w="med" len="med"/>
+                      <a:tailEnd type="none" w="med" len="med"/>
+                    </a:lnB>
+                  </a:tcPr>
+                </a:tc>
+                <a:tc>
+                  <a:txBody>
+                    <a:bodyPr/>
+                    <a:lstStyle/>
+                    <a:p>
+                      <a:pPr fontAlgn="ctr"/>
+                      <a:r>
+                        <a:rPr lang="en-US" sz="1200" b="0" dirty="0">
+                          <a:solidFill>
+                            <a:srgbClr val="333E48"/>
+                          </a:solidFill>
+                          <a:effectLst/>
+                        </a:rPr>
+                        <a:t>FIQ/</a:t>
+                      </a:r>
+                      <a:r>
+                        <a:rPr lang="en-US" sz="1200" b="0" dirty="0" err="1">
+                          <a:solidFill>
+                            <a:srgbClr val="333E48"/>
+                          </a:solidFill>
+                          <a:effectLst/>
+                        </a:rPr>
+                        <a:t>vFIQ</a:t>
+                      </a:r>
+                      <a:endParaRPr lang="en-US" sz="1200" b="0" dirty="0">
+                        <a:solidFill>
+                          <a:srgbClr val="333E48"/>
+                        </a:solidFill>
+                        <a:effectLst/>
+                      </a:endParaRPr>
+                    </a:p>
+                  </a:txBody>
+                  <a:tcPr marL="112889" marR="112889" marT="70556" marB="70556" anchor="ctr">
+                    <a:lnL>
+                      <a:noFill/>
+                    </a:lnL>
+                    <a:lnR>
+                      <a:noFill/>
+                    </a:lnR>
+                    <a:lnT w="9525" cap="flat" cmpd="sng" algn="ctr">
+                      <a:solidFill>
+                        <a:srgbClr val="E5ECEB"/>
+                      </a:solidFill>
+                      <a:prstDash val="solid"/>
+                      <a:round/>
+                      <a:headEnd type="none" w="med" len="med"/>
+                      <a:tailEnd type="none" w="med" len="med"/>
+                    </a:lnT>
+                    <a:lnB w="9525" cap="flat" cmpd="sng" algn="ctr">
+                      <a:solidFill>
+                        <a:srgbClr val="E5ECEB"/>
+                      </a:solidFill>
+                      <a:prstDash val="solid"/>
+                      <a:round/>
+                      <a:headEnd type="none" w="med" len="med"/>
+                      <a:tailEnd type="none" w="med" len="med"/>
+                    </a:lnB>
+                  </a:tcPr>
+                </a:tc>
+                <a:tc vMerge="1">
+                  <a:txBody>
+                    <a:bodyPr/>
+                    <a:lstStyle/>
+                    <a:p>
+                      <a:endParaRPr lang="en-US"/>
+                    </a:p>
+                  </a:txBody>
+                  <a:tcPr/>
+                </a:tc>
+                <a:extLst>
+                  <a:ext uri="{0D108BD9-81ED-4DB2-BD59-A6C34878D82A}">
+                    <a16:rowId xmlns:a16="http://schemas.microsoft.com/office/drawing/2014/main" val="2822642013"/>
+                  </a:ext>
+                </a:extLst>
+              </a:tr>
+              <a:tr h="344311">
+                <a:tc>
+                  <a:txBody>
+                    <a:bodyPr/>
+                    <a:lstStyle/>
+                    <a:p>
+                      <a:pPr fontAlgn="ctr"/>
+                      <a:r>
+                        <a:rPr lang="en-US" sz="1200" b="0" dirty="0">
+                          <a:solidFill>
+                            <a:srgbClr val="333E48"/>
+                          </a:solidFill>
+                          <a:effectLst/>
+                        </a:rPr>
+                        <a:t>128 (0x80)</a:t>
+                      </a:r>
+                    </a:p>
+                  </a:txBody>
+                  <a:tcPr marL="112889" marR="112889" marT="70556" marB="70556" anchor="ctr">
+                    <a:lnL>
+                      <a:noFill/>
+                    </a:lnL>
+                    <a:lnR>
+                      <a:noFill/>
+                    </a:lnR>
+                    <a:lnT w="9525" cap="flat" cmpd="sng" algn="ctr">
+                      <a:solidFill>
+                        <a:srgbClr val="E5ECEB"/>
+                      </a:solidFill>
+                      <a:prstDash val="solid"/>
+                      <a:round/>
+                      <a:headEnd type="none" w="med" len="med"/>
+                      <a:tailEnd type="none" w="med" len="med"/>
+                    </a:lnT>
+                    <a:lnB w="9525" cap="flat" cmpd="sng" algn="ctr">
+                      <a:solidFill>
+                        <a:srgbClr val="E5ECEB"/>
+                      </a:solidFill>
+                      <a:prstDash val="solid"/>
+                      <a:round/>
+                      <a:headEnd type="none" w="med" len="med"/>
+                      <a:tailEnd type="none" w="med" len="med"/>
+                    </a:lnB>
+                  </a:tcPr>
+                </a:tc>
+                <a:tc>
+                  <a:txBody>
+                    <a:bodyPr/>
+                    <a:lstStyle/>
+                    <a:p>
+                      <a:pPr fontAlgn="ctr"/>
+                      <a:r>
+                        <a:rPr lang="en-US" sz="1200" b="0" dirty="0" err="1">
+                          <a:solidFill>
+                            <a:srgbClr val="333E48"/>
+                          </a:solidFill>
+                          <a:effectLst/>
+                        </a:rPr>
+                        <a:t>SError</a:t>
+                      </a:r>
+                      <a:r>
+                        <a:rPr lang="en-US" sz="1200" b="0" dirty="0">
+                          <a:solidFill>
+                            <a:srgbClr val="333E48"/>
+                          </a:solidFill>
+                          <a:effectLst/>
+                        </a:rPr>
+                        <a:t>/</a:t>
+                      </a:r>
+                      <a:r>
+                        <a:rPr lang="en-US" sz="1200" b="0" dirty="0" err="1">
+                          <a:solidFill>
+                            <a:srgbClr val="333E48"/>
+                          </a:solidFill>
+                          <a:effectLst/>
+                        </a:rPr>
+                        <a:t>vSError</a:t>
+                      </a:r>
+                      <a:endParaRPr lang="en-US" sz="1200" b="0" dirty="0">
+                        <a:solidFill>
+                          <a:srgbClr val="333E48"/>
+                        </a:solidFill>
+                        <a:effectLst/>
+                      </a:endParaRPr>
+                    </a:p>
+                  </a:txBody>
+                  <a:tcPr marL="112889" marR="112889" marT="70556" marB="70556" anchor="ctr">
+                    <a:lnL>
+                      <a:noFill/>
+                    </a:lnL>
+                    <a:lnR>
+                      <a:noFill/>
+                    </a:lnR>
+                    <a:lnT w="9525" cap="flat" cmpd="sng" algn="ctr">
+                      <a:solidFill>
+                        <a:srgbClr val="E5ECEB"/>
+                      </a:solidFill>
+                      <a:prstDash val="solid"/>
+                      <a:round/>
+                      <a:headEnd type="none" w="med" len="med"/>
+                      <a:tailEnd type="none" w="med" len="med"/>
+                    </a:lnT>
+                    <a:lnB w="9525" cap="flat" cmpd="sng" algn="ctr">
+                      <a:solidFill>
+                        <a:srgbClr val="E5ECEB"/>
+                      </a:solidFill>
+                      <a:prstDash val="solid"/>
+                      <a:round/>
+                      <a:headEnd type="none" w="med" len="med"/>
+                      <a:tailEnd type="none" w="med" len="med"/>
+                    </a:lnB>
+                  </a:tcPr>
+                </a:tc>
+                <a:tc vMerge="1">
+                  <a:txBody>
+                    <a:bodyPr/>
+                    <a:lstStyle/>
+                    <a:p>
+                      <a:endParaRPr lang="en-US"/>
+                    </a:p>
+                  </a:txBody>
+                  <a:tcPr/>
+                </a:tc>
+                <a:extLst>
+                  <a:ext uri="{0D108BD9-81ED-4DB2-BD59-A6C34878D82A}">
+                    <a16:rowId xmlns:a16="http://schemas.microsoft.com/office/drawing/2014/main" val="119895202"/>
+                  </a:ext>
+                </a:extLst>
+              </a:tr>
+              <a:tr h="344311">
+                <a:tc>
+                  <a:txBody>
+                    <a:bodyPr/>
+                    <a:lstStyle/>
+                    <a:p>
+                      <a:pPr fontAlgn="ctr"/>
+                      <a:r>
+                        <a:rPr lang="en-US" sz="1200" b="0" dirty="0">
+                          <a:solidFill>
+                            <a:srgbClr val="333E48"/>
+                          </a:solidFill>
+                          <a:effectLst/>
+                        </a:rPr>
+                        <a:t>128 (0x80)</a:t>
+                      </a:r>
+                    </a:p>
+                  </a:txBody>
+                  <a:tcPr marL="112889" marR="112889" marT="70556" marB="70556" anchor="ctr">
+                    <a:lnL>
+                      <a:noFill/>
+                    </a:lnL>
+                    <a:lnR>
+                      <a:noFill/>
+                    </a:lnR>
+                    <a:lnT w="9525" cap="flat" cmpd="sng" algn="ctr">
+                      <a:solidFill>
+                        <a:srgbClr val="E5ECEB"/>
+                      </a:solidFill>
+                      <a:prstDash val="solid"/>
+                      <a:round/>
+                      <a:headEnd type="none" w="med" len="med"/>
+                      <a:tailEnd type="none" w="med" len="med"/>
+                    </a:lnT>
+                    <a:lnB w="9525" cap="flat" cmpd="sng" algn="ctr">
+                      <a:solidFill>
+                        <a:srgbClr val="E5ECEB"/>
+                      </a:solidFill>
+                      <a:prstDash val="solid"/>
+                      <a:round/>
+                      <a:headEnd type="none" w="med" len="med"/>
+                      <a:tailEnd type="none" w="med" len="med"/>
+                    </a:lnB>
+                  </a:tcPr>
+                </a:tc>
+                <a:tc>
+                  <a:txBody>
+                    <a:bodyPr/>
+                    <a:lstStyle/>
+                    <a:p>
+                      <a:pPr fontAlgn="ctr"/>
+                      <a:r>
+                        <a:rPr lang="en-US" sz="1200" b="0">
+                          <a:solidFill>
+                            <a:srgbClr val="333E48"/>
+                          </a:solidFill>
+                          <a:effectLst/>
+                        </a:rPr>
+                        <a:t>Synchronous</a:t>
+                      </a:r>
+                    </a:p>
+                  </a:txBody>
+                  <a:tcPr marL="112889" marR="112889" marT="70556" marB="70556" anchor="ctr">
+                    <a:lnL>
+                      <a:noFill/>
+                    </a:lnL>
+                    <a:lnR>
+                      <a:noFill/>
+                    </a:lnR>
+                    <a:lnT w="9525" cap="flat" cmpd="sng" algn="ctr">
+                      <a:solidFill>
+                        <a:srgbClr val="E5ECEB"/>
+                      </a:solidFill>
+                      <a:prstDash val="solid"/>
+                      <a:round/>
+                      <a:headEnd type="none" w="med" len="med"/>
+                      <a:tailEnd type="none" w="med" len="med"/>
+                    </a:lnT>
+                    <a:lnB w="9525" cap="flat" cmpd="sng" algn="ctr">
+                      <a:solidFill>
+                        <a:srgbClr val="E5ECEB"/>
+                      </a:solidFill>
+                      <a:prstDash val="solid"/>
+                      <a:round/>
+                      <a:headEnd type="none" w="med" len="med"/>
+                      <a:tailEnd type="none" w="med" len="med"/>
+                    </a:lnB>
+                  </a:tcPr>
+                </a:tc>
+                <a:tc rowSpan="4">
+                  <a:txBody>
+                    <a:bodyPr/>
+                    <a:lstStyle/>
+                    <a:p>
+                      <a:pPr fontAlgn="ctr"/>
+                      <a:r>
+                        <a:rPr lang="en-US" sz="1200" b="0" dirty="0">
+                          <a:solidFill>
+                            <a:srgbClr val="333E48"/>
+                          </a:solidFill>
+                          <a:effectLst/>
+                        </a:rPr>
+                        <a:t>EL0_64</a:t>
+                      </a:r>
+                    </a:p>
+                    <a:p>
+                      <a:pPr fontAlgn="ctr"/>
+                      <a:r>
+                        <a:rPr lang="en-US" sz="1200" b="0" dirty="0">
+                          <a:solidFill>
+                            <a:srgbClr val="333E48"/>
+                          </a:solidFill>
+                          <a:effectLst/>
+                        </a:rPr>
+                        <a:t>(Lower EL using AArch64)</a:t>
+                      </a:r>
+                    </a:p>
+                  </a:txBody>
+                  <a:tcPr marL="112889" marR="112889" marT="70556" marB="70556" anchor="ctr">
+                    <a:lnL>
+                      <a:noFill/>
+                    </a:lnL>
+                    <a:lnR>
+                      <a:noFill/>
+                    </a:lnR>
+                    <a:lnT w="9525" cap="flat" cmpd="sng" algn="ctr">
+                      <a:solidFill>
+                        <a:srgbClr val="E5ECEB"/>
+                      </a:solidFill>
+                      <a:prstDash val="solid"/>
+                      <a:round/>
+                      <a:headEnd type="none" w="med" len="med"/>
+                      <a:tailEnd type="none" w="med" len="med"/>
+                    </a:lnT>
+                    <a:lnB w="9525" cap="flat" cmpd="sng" algn="ctr">
+                      <a:solidFill>
+                        <a:srgbClr val="E5ECEB"/>
+                      </a:solidFill>
+                      <a:prstDash val="solid"/>
+                      <a:round/>
+                      <a:headEnd type="none" w="med" len="med"/>
+                      <a:tailEnd type="none" w="med" len="med"/>
+                    </a:lnB>
+                  </a:tcPr>
+                </a:tc>
+                <a:extLst>
+                  <a:ext uri="{0D108BD9-81ED-4DB2-BD59-A6C34878D82A}">
+                    <a16:rowId xmlns:a16="http://schemas.microsoft.com/office/drawing/2014/main" val="1221655632"/>
+                  </a:ext>
+                </a:extLst>
+              </a:tr>
+              <a:tr h="344311">
+                <a:tc>
+                  <a:txBody>
+                    <a:bodyPr/>
+                    <a:lstStyle/>
+                    <a:p>
+                      <a:pPr fontAlgn="ctr"/>
+                      <a:r>
+                        <a:rPr lang="en-US" sz="1200" b="0" dirty="0">
+                          <a:solidFill>
+                            <a:srgbClr val="333E48"/>
+                          </a:solidFill>
+                          <a:effectLst/>
+                        </a:rPr>
+                        <a:t>128 (0x80)</a:t>
+                      </a:r>
+                    </a:p>
+                  </a:txBody>
+                  <a:tcPr marL="112889" marR="112889" marT="70556" marB="70556" anchor="ctr">
+                    <a:lnL>
+                      <a:noFill/>
+                    </a:lnL>
+                    <a:lnR>
+                      <a:noFill/>
+                    </a:lnR>
+                    <a:lnT w="9525" cap="flat" cmpd="sng" algn="ctr">
+                      <a:solidFill>
+                        <a:srgbClr val="E5ECEB"/>
+                      </a:solidFill>
+                      <a:prstDash val="solid"/>
+                      <a:round/>
+                      <a:headEnd type="none" w="med" len="med"/>
+                      <a:tailEnd type="none" w="med" len="med"/>
+                    </a:lnT>
+                    <a:lnB w="9525" cap="flat" cmpd="sng" algn="ctr">
+                      <a:solidFill>
+                        <a:srgbClr val="E5ECEB"/>
+                      </a:solidFill>
+                      <a:prstDash val="solid"/>
+                      <a:round/>
+                      <a:headEnd type="none" w="med" len="med"/>
+                      <a:tailEnd type="none" w="med" len="med"/>
+                    </a:lnB>
+                  </a:tcPr>
+                </a:tc>
+                <a:tc>
+                  <a:txBody>
+                    <a:bodyPr/>
+                    <a:lstStyle/>
+                    <a:p>
+                      <a:pPr fontAlgn="ctr"/>
+                      <a:r>
+                        <a:rPr lang="en-US" sz="1200" b="0">
+                          <a:solidFill>
+                            <a:srgbClr val="333E48"/>
+                          </a:solidFill>
+                          <a:effectLst/>
+                        </a:rPr>
+                        <a:t>IRQ/vIRQ</a:t>
+                      </a:r>
+                    </a:p>
+                  </a:txBody>
+                  <a:tcPr marL="112889" marR="112889" marT="70556" marB="70556" anchor="ctr">
+                    <a:lnL>
+                      <a:noFill/>
+                    </a:lnL>
+                    <a:lnR>
+                      <a:noFill/>
+                    </a:lnR>
+                    <a:lnT w="9525" cap="flat" cmpd="sng" algn="ctr">
+                      <a:solidFill>
+                        <a:srgbClr val="E5ECEB"/>
+                      </a:solidFill>
+                      <a:prstDash val="solid"/>
+                      <a:round/>
+                      <a:headEnd type="none" w="med" len="med"/>
+                      <a:tailEnd type="none" w="med" len="med"/>
+                    </a:lnT>
+                    <a:lnB w="9525" cap="flat" cmpd="sng" algn="ctr">
+                      <a:solidFill>
+                        <a:srgbClr val="E5ECEB"/>
+                      </a:solidFill>
+                      <a:prstDash val="solid"/>
+                      <a:round/>
+                      <a:headEnd type="none" w="med" len="med"/>
+                      <a:tailEnd type="none" w="med" len="med"/>
+                    </a:lnB>
+                  </a:tcPr>
+                </a:tc>
+                <a:tc vMerge="1">
+                  <a:txBody>
+                    <a:bodyPr/>
+                    <a:lstStyle/>
+                    <a:p>
+                      <a:endParaRPr lang="en-US"/>
+                    </a:p>
+                  </a:txBody>
+                  <a:tcPr/>
+                </a:tc>
+                <a:extLst>
+                  <a:ext uri="{0D108BD9-81ED-4DB2-BD59-A6C34878D82A}">
+                    <a16:rowId xmlns:a16="http://schemas.microsoft.com/office/drawing/2014/main" val="479120065"/>
+                  </a:ext>
+                </a:extLst>
+              </a:tr>
+              <a:tr h="344311">
+                <a:tc>
+                  <a:txBody>
+                    <a:bodyPr/>
+                    <a:lstStyle/>
+                    <a:p>
+                      <a:pPr fontAlgn="ctr"/>
+                      <a:r>
+                        <a:rPr lang="en-US" sz="1200" b="0" dirty="0">
+                          <a:solidFill>
+                            <a:srgbClr val="333E48"/>
+                          </a:solidFill>
+                          <a:effectLst/>
+                        </a:rPr>
+                        <a:t>128 (0x80)</a:t>
+                      </a:r>
+                    </a:p>
+                  </a:txBody>
+                  <a:tcPr marL="112889" marR="112889" marT="70556" marB="70556" anchor="ctr">
+                    <a:lnL>
+                      <a:noFill/>
+                    </a:lnL>
+                    <a:lnR>
+                      <a:noFill/>
+                    </a:lnR>
+                    <a:lnT w="9525" cap="flat" cmpd="sng" algn="ctr">
+                      <a:solidFill>
+                        <a:srgbClr val="E5ECEB"/>
+                      </a:solidFill>
+                      <a:prstDash val="solid"/>
+                      <a:round/>
+                      <a:headEnd type="none" w="med" len="med"/>
+                      <a:tailEnd type="none" w="med" len="med"/>
+                    </a:lnT>
+                    <a:lnB w="9525" cap="flat" cmpd="sng" algn="ctr">
+                      <a:solidFill>
+                        <a:srgbClr val="E5ECEB"/>
+                      </a:solidFill>
+                      <a:prstDash val="solid"/>
+                      <a:round/>
+                      <a:headEnd type="none" w="med" len="med"/>
+                      <a:tailEnd type="none" w="med" len="med"/>
+                    </a:lnB>
+                  </a:tcPr>
+                </a:tc>
+                <a:tc>
+                  <a:txBody>
+                    <a:bodyPr/>
+                    <a:lstStyle/>
+                    <a:p>
+                      <a:pPr fontAlgn="ctr"/>
+                      <a:r>
+                        <a:rPr lang="en-US" sz="1200" b="0">
+                          <a:solidFill>
+                            <a:srgbClr val="333E48"/>
+                          </a:solidFill>
+                          <a:effectLst/>
+                        </a:rPr>
+                        <a:t>FIQ/vFIQ</a:t>
+                      </a:r>
+                    </a:p>
+                  </a:txBody>
+                  <a:tcPr marL="112889" marR="112889" marT="70556" marB="70556" anchor="ctr">
+                    <a:lnL>
+                      <a:noFill/>
+                    </a:lnL>
+                    <a:lnR>
+                      <a:noFill/>
+                    </a:lnR>
+                    <a:lnT w="9525" cap="flat" cmpd="sng" algn="ctr">
+                      <a:solidFill>
+                        <a:srgbClr val="E5ECEB"/>
+                      </a:solidFill>
+                      <a:prstDash val="solid"/>
+                      <a:round/>
+                      <a:headEnd type="none" w="med" len="med"/>
+                      <a:tailEnd type="none" w="med" len="med"/>
+                    </a:lnT>
+                    <a:lnB w="9525" cap="flat" cmpd="sng" algn="ctr">
+                      <a:solidFill>
+                        <a:srgbClr val="E5ECEB"/>
+                      </a:solidFill>
+                      <a:prstDash val="solid"/>
+                      <a:round/>
+                      <a:headEnd type="none" w="med" len="med"/>
+                      <a:tailEnd type="none" w="med" len="med"/>
+                    </a:lnB>
+                  </a:tcPr>
+                </a:tc>
+                <a:tc vMerge="1">
+                  <a:txBody>
+                    <a:bodyPr/>
+                    <a:lstStyle/>
+                    <a:p>
+                      <a:endParaRPr lang="en-US"/>
+                    </a:p>
+                  </a:txBody>
+                  <a:tcPr/>
+                </a:tc>
+                <a:extLst>
+                  <a:ext uri="{0D108BD9-81ED-4DB2-BD59-A6C34878D82A}">
+                    <a16:rowId xmlns:a16="http://schemas.microsoft.com/office/drawing/2014/main" val="4164513790"/>
+                  </a:ext>
+                </a:extLst>
+              </a:tr>
+              <a:tr h="344311">
+                <a:tc>
+                  <a:txBody>
+                    <a:bodyPr/>
+                    <a:lstStyle/>
+                    <a:p>
+                      <a:pPr fontAlgn="ctr"/>
+                      <a:r>
+                        <a:rPr lang="en-US" sz="1200" b="0" dirty="0">
+                          <a:solidFill>
+                            <a:srgbClr val="333E48"/>
+                          </a:solidFill>
+                          <a:effectLst/>
+                        </a:rPr>
+                        <a:t>128 (0x80)</a:t>
+                      </a:r>
+                    </a:p>
+                  </a:txBody>
+                  <a:tcPr marL="112889" marR="112889" marT="70556" marB="70556" anchor="ctr">
+                    <a:lnL>
+                      <a:noFill/>
+                    </a:lnL>
+                    <a:lnR>
+                      <a:noFill/>
+                    </a:lnR>
+                    <a:lnT w="9525" cap="flat" cmpd="sng" algn="ctr">
+                      <a:solidFill>
+                        <a:srgbClr val="E5ECEB"/>
+                      </a:solidFill>
+                      <a:prstDash val="solid"/>
+                      <a:round/>
+                      <a:headEnd type="none" w="med" len="med"/>
+                      <a:tailEnd type="none" w="med" len="med"/>
+                    </a:lnT>
+                    <a:lnB w="9525" cap="flat" cmpd="sng" algn="ctr">
+                      <a:solidFill>
+                        <a:srgbClr val="E5ECEB"/>
+                      </a:solidFill>
+                      <a:prstDash val="solid"/>
+                      <a:round/>
+                      <a:headEnd type="none" w="med" len="med"/>
+                      <a:tailEnd type="none" w="med" len="med"/>
+                    </a:lnB>
+                  </a:tcPr>
+                </a:tc>
+                <a:tc>
+                  <a:txBody>
+                    <a:bodyPr/>
+                    <a:lstStyle/>
+                    <a:p>
+                      <a:pPr fontAlgn="ctr"/>
+                      <a:r>
+                        <a:rPr lang="en-US" sz="1200" b="0">
+                          <a:solidFill>
+                            <a:srgbClr val="333E48"/>
+                          </a:solidFill>
+                          <a:effectLst/>
+                        </a:rPr>
+                        <a:t>SError/vSError</a:t>
+                      </a:r>
+                    </a:p>
+                  </a:txBody>
+                  <a:tcPr marL="112889" marR="112889" marT="70556" marB="70556" anchor="ctr">
+                    <a:lnL>
+                      <a:noFill/>
+                    </a:lnL>
+                    <a:lnR>
+                      <a:noFill/>
+                    </a:lnR>
+                    <a:lnT w="9525" cap="flat" cmpd="sng" algn="ctr">
+                      <a:solidFill>
+                        <a:srgbClr val="E5ECEB"/>
+                      </a:solidFill>
+                      <a:prstDash val="solid"/>
+                      <a:round/>
+                      <a:headEnd type="none" w="med" len="med"/>
+                      <a:tailEnd type="none" w="med" len="med"/>
+                    </a:lnT>
+                    <a:lnB w="9525" cap="flat" cmpd="sng" algn="ctr">
+                      <a:solidFill>
+                        <a:srgbClr val="E5ECEB"/>
+                      </a:solidFill>
+                      <a:prstDash val="solid"/>
+                      <a:round/>
+                      <a:headEnd type="none" w="med" len="med"/>
+                      <a:tailEnd type="none" w="med" len="med"/>
+                    </a:lnB>
+                  </a:tcPr>
+                </a:tc>
+                <a:tc vMerge="1">
+                  <a:txBody>
+                    <a:bodyPr/>
+                    <a:lstStyle/>
+                    <a:p>
+                      <a:endParaRPr lang="en-US"/>
+                    </a:p>
+                  </a:txBody>
+                  <a:tcPr/>
+                </a:tc>
+                <a:extLst>
+                  <a:ext uri="{0D108BD9-81ED-4DB2-BD59-A6C34878D82A}">
+                    <a16:rowId xmlns:a16="http://schemas.microsoft.com/office/drawing/2014/main" val="2864848212"/>
+                  </a:ext>
+                </a:extLst>
+              </a:tr>
+              <a:tr h="344311">
+                <a:tc>
+                  <a:txBody>
+                    <a:bodyPr/>
+                    <a:lstStyle/>
+                    <a:p>
+                      <a:pPr marL="0" marR="0" lvl="0" indent="0" algn="l" defTabSz="914400" rtl="0" eaLnBrk="1" fontAlgn="ctr" latinLnBrk="0" hangingPunct="1">
+                        <a:lnSpc>
+                          <a:spcPct val="100000"/>
+                        </a:lnSpc>
+                        <a:spcBef>
+                          <a:spcPts val="0"/>
+                        </a:spcBef>
+                        <a:spcAft>
+                          <a:spcPts val="0"/>
+                        </a:spcAft>
+                        <a:buClrTx/>
+                        <a:buSzTx/>
+                        <a:buFontTx/>
+                        <a:buNone/>
+                        <a:tabLst/>
+                        <a:defRPr/>
+                      </a:pPr>
+                      <a:r>
+                        <a:rPr lang="en-US" sz="1200" b="0" dirty="0">
+                          <a:solidFill>
+                            <a:srgbClr val="333E48"/>
+                          </a:solidFill>
+                          <a:effectLst/>
+                        </a:rPr>
+                        <a:t>128 (0x80)</a:t>
+                      </a:r>
+                    </a:p>
+                  </a:txBody>
+                  <a:tcPr marL="112889" marR="112889" marT="70556" marB="70556" anchor="ctr">
+                    <a:lnL>
+                      <a:noFill/>
+                    </a:lnL>
+                    <a:lnR>
+                      <a:noFill/>
+                    </a:lnR>
+                    <a:lnT w="9525" cap="flat" cmpd="sng" algn="ctr">
+                      <a:solidFill>
+                        <a:srgbClr val="E5ECEB"/>
+                      </a:solidFill>
+                      <a:prstDash val="solid"/>
+                      <a:round/>
+                      <a:headEnd type="none" w="med" len="med"/>
+                      <a:tailEnd type="none" w="med" len="med"/>
+                    </a:lnT>
+                    <a:lnB w="9525" cap="flat" cmpd="sng" algn="ctr">
+                      <a:solidFill>
+                        <a:srgbClr val="E5ECEB"/>
+                      </a:solidFill>
+                      <a:prstDash val="solid"/>
+                      <a:round/>
+                      <a:headEnd type="none" w="med" len="med"/>
+                      <a:tailEnd type="none" w="med" len="med"/>
+                    </a:lnB>
+                  </a:tcPr>
+                </a:tc>
+                <a:tc>
+                  <a:txBody>
+                    <a:bodyPr/>
+                    <a:lstStyle/>
+                    <a:p>
+                      <a:pPr fontAlgn="ctr"/>
+                      <a:r>
+                        <a:rPr lang="en-US" sz="1200" b="0">
+                          <a:solidFill>
+                            <a:srgbClr val="333E48"/>
+                          </a:solidFill>
+                          <a:effectLst/>
+                        </a:rPr>
+                        <a:t>Synchronous</a:t>
+                      </a:r>
+                    </a:p>
+                  </a:txBody>
+                  <a:tcPr marL="112889" marR="112889" marT="70556" marB="70556" anchor="ctr">
+                    <a:lnL>
+                      <a:noFill/>
+                    </a:lnL>
+                    <a:lnR>
+                      <a:noFill/>
+                    </a:lnR>
+                    <a:lnT w="9525" cap="flat" cmpd="sng" algn="ctr">
+                      <a:solidFill>
+                        <a:srgbClr val="E5ECEB"/>
+                      </a:solidFill>
+                      <a:prstDash val="solid"/>
+                      <a:round/>
+                      <a:headEnd type="none" w="med" len="med"/>
+                      <a:tailEnd type="none" w="med" len="med"/>
+                    </a:lnT>
+                    <a:lnB w="9525" cap="flat" cmpd="sng" algn="ctr">
+                      <a:solidFill>
+                        <a:srgbClr val="E5ECEB"/>
+                      </a:solidFill>
+                      <a:prstDash val="solid"/>
+                      <a:round/>
+                      <a:headEnd type="none" w="med" len="med"/>
+                      <a:tailEnd type="none" w="med" len="med"/>
+                    </a:lnB>
+                  </a:tcPr>
+                </a:tc>
+                <a:tc rowSpan="4">
+                  <a:txBody>
+                    <a:bodyPr/>
+                    <a:lstStyle/>
+                    <a:p>
+                      <a:pPr fontAlgn="ctr"/>
+                      <a:r>
+                        <a:rPr lang="en-US" sz="1200" b="0" dirty="0">
+                          <a:solidFill>
+                            <a:srgbClr val="333E48"/>
+                          </a:solidFill>
+                          <a:effectLst/>
+                        </a:rPr>
+                        <a:t>EL0_32</a:t>
+                      </a:r>
+                    </a:p>
+                    <a:p>
+                      <a:pPr fontAlgn="ctr"/>
+                      <a:r>
+                        <a:rPr lang="en-US" sz="1200" b="0" dirty="0">
+                          <a:solidFill>
+                            <a:srgbClr val="333E48"/>
+                          </a:solidFill>
+                          <a:effectLst/>
+                        </a:rPr>
+                        <a:t>(Lower EL using AArch32)</a:t>
+                      </a:r>
+                    </a:p>
+                  </a:txBody>
+                  <a:tcPr marL="112889" marR="112889" marT="70556" marB="70556" anchor="ctr">
+                    <a:lnL>
+                      <a:noFill/>
+                    </a:lnL>
+                    <a:lnR>
+                      <a:noFill/>
+                    </a:lnR>
+                    <a:lnT w="9525" cap="flat" cmpd="sng" algn="ctr">
+                      <a:solidFill>
+                        <a:srgbClr val="E5ECEB"/>
+                      </a:solidFill>
+                      <a:prstDash val="solid"/>
+                      <a:round/>
+                      <a:headEnd type="none" w="med" len="med"/>
+                      <a:tailEnd type="none" w="med" len="med"/>
+                    </a:lnT>
+                    <a:lnB>
+                      <a:noFill/>
+                    </a:lnB>
+                  </a:tcPr>
+                </a:tc>
+                <a:extLst>
+                  <a:ext uri="{0D108BD9-81ED-4DB2-BD59-A6C34878D82A}">
+                    <a16:rowId xmlns:a16="http://schemas.microsoft.com/office/drawing/2014/main" val="2449046665"/>
+                  </a:ext>
+                </a:extLst>
+              </a:tr>
+              <a:tr h="344311">
+                <a:tc>
+                  <a:txBody>
+                    <a:bodyPr/>
+                    <a:lstStyle/>
+                    <a:p>
+                      <a:pPr marL="0" marR="0" lvl="0" indent="0" algn="l" defTabSz="914400" rtl="0" eaLnBrk="1" fontAlgn="ctr" latinLnBrk="0" hangingPunct="1">
+                        <a:lnSpc>
+                          <a:spcPct val="100000"/>
+                        </a:lnSpc>
+                        <a:spcBef>
+                          <a:spcPts val="0"/>
+                        </a:spcBef>
+                        <a:spcAft>
+                          <a:spcPts val="0"/>
+                        </a:spcAft>
+                        <a:buClrTx/>
+                        <a:buSzTx/>
+                        <a:buFontTx/>
+                        <a:buNone/>
+                        <a:tabLst/>
+                        <a:defRPr/>
+                      </a:pPr>
+                      <a:r>
+                        <a:rPr lang="en-US" sz="1200" b="0" dirty="0">
+                          <a:solidFill>
+                            <a:srgbClr val="333E48"/>
+                          </a:solidFill>
+                          <a:effectLst/>
+                        </a:rPr>
+                        <a:t>128 (0x80)</a:t>
+                      </a:r>
+                    </a:p>
+                  </a:txBody>
+                  <a:tcPr marL="112889" marR="112889" marT="70556" marB="70556" anchor="ctr">
+                    <a:lnL>
+                      <a:noFill/>
+                    </a:lnL>
+                    <a:lnR>
+                      <a:noFill/>
+                    </a:lnR>
+                    <a:lnT w="9525" cap="flat" cmpd="sng" algn="ctr">
+                      <a:solidFill>
+                        <a:srgbClr val="E5ECEB"/>
+                      </a:solidFill>
+                      <a:prstDash val="solid"/>
+                      <a:round/>
+                      <a:headEnd type="none" w="med" len="med"/>
+                      <a:tailEnd type="none" w="med" len="med"/>
+                    </a:lnT>
+                    <a:lnB w="9525" cap="flat" cmpd="sng" algn="ctr">
+                      <a:solidFill>
+                        <a:srgbClr val="E5ECEB"/>
+                      </a:solidFill>
+                      <a:prstDash val="solid"/>
+                      <a:round/>
+                      <a:headEnd type="none" w="med" len="med"/>
+                      <a:tailEnd type="none" w="med" len="med"/>
+                    </a:lnB>
+                  </a:tcPr>
+                </a:tc>
+                <a:tc>
+                  <a:txBody>
+                    <a:bodyPr/>
+                    <a:lstStyle/>
+                    <a:p>
+                      <a:pPr fontAlgn="ctr"/>
+                      <a:r>
+                        <a:rPr lang="en-US" sz="1200" b="0">
+                          <a:solidFill>
+                            <a:srgbClr val="333E48"/>
+                          </a:solidFill>
+                          <a:effectLst/>
+                        </a:rPr>
+                        <a:t>IRQ/vIRQ</a:t>
+                      </a:r>
+                    </a:p>
+                  </a:txBody>
+                  <a:tcPr marL="112889" marR="112889" marT="70556" marB="70556" anchor="ctr">
+                    <a:lnL>
+                      <a:noFill/>
+                    </a:lnL>
+                    <a:lnR>
+                      <a:noFill/>
+                    </a:lnR>
+                    <a:lnT w="9525" cap="flat" cmpd="sng" algn="ctr">
+                      <a:solidFill>
+                        <a:srgbClr val="E5ECEB"/>
+                      </a:solidFill>
+                      <a:prstDash val="solid"/>
+                      <a:round/>
+                      <a:headEnd type="none" w="med" len="med"/>
+                      <a:tailEnd type="none" w="med" len="med"/>
+                    </a:lnT>
+                    <a:lnB w="9525" cap="flat" cmpd="sng" algn="ctr">
+                      <a:solidFill>
+                        <a:srgbClr val="E5ECEB"/>
+                      </a:solidFill>
+                      <a:prstDash val="solid"/>
+                      <a:round/>
+                      <a:headEnd type="none" w="med" len="med"/>
+                      <a:tailEnd type="none" w="med" len="med"/>
+                    </a:lnB>
+                  </a:tcPr>
+                </a:tc>
+                <a:tc vMerge="1">
+                  <a:txBody>
+                    <a:bodyPr/>
+                    <a:lstStyle/>
+                    <a:p>
+                      <a:endParaRPr lang="en-US"/>
+                    </a:p>
+                  </a:txBody>
+                  <a:tcPr/>
+                </a:tc>
+                <a:extLst>
+                  <a:ext uri="{0D108BD9-81ED-4DB2-BD59-A6C34878D82A}">
+                    <a16:rowId xmlns:a16="http://schemas.microsoft.com/office/drawing/2014/main" val="2666279573"/>
+                  </a:ext>
+                </a:extLst>
+              </a:tr>
+              <a:tr h="344311">
+                <a:tc>
+                  <a:txBody>
+                    <a:bodyPr/>
+                    <a:lstStyle/>
+                    <a:p>
+                      <a:pPr marL="0" marR="0" lvl="0" indent="0" algn="l" defTabSz="914400" rtl="0" eaLnBrk="1" fontAlgn="ctr" latinLnBrk="0" hangingPunct="1">
+                        <a:lnSpc>
+                          <a:spcPct val="100000"/>
+                        </a:lnSpc>
+                        <a:spcBef>
+                          <a:spcPts val="0"/>
+                        </a:spcBef>
+                        <a:spcAft>
+                          <a:spcPts val="0"/>
+                        </a:spcAft>
+                        <a:buClrTx/>
+                        <a:buSzTx/>
+                        <a:buFontTx/>
+                        <a:buNone/>
+                        <a:tabLst/>
+                        <a:defRPr/>
+                      </a:pPr>
+                      <a:r>
+                        <a:rPr lang="en-US" sz="1200" b="0" dirty="0">
+                          <a:solidFill>
+                            <a:srgbClr val="333E48"/>
+                          </a:solidFill>
+                          <a:effectLst/>
+                        </a:rPr>
+                        <a:t>128 (0x80)</a:t>
+                      </a:r>
+                    </a:p>
+                  </a:txBody>
+                  <a:tcPr marL="112889" marR="112889" marT="70556" marB="70556" anchor="ctr">
+                    <a:lnL>
+                      <a:noFill/>
+                    </a:lnL>
+                    <a:lnR>
+                      <a:noFill/>
+                    </a:lnR>
+                    <a:lnT w="9525" cap="flat" cmpd="sng" algn="ctr">
+                      <a:solidFill>
+                        <a:srgbClr val="E5ECEB"/>
+                      </a:solidFill>
+                      <a:prstDash val="solid"/>
+                      <a:round/>
+                      <a:headEnd type="none" w="med" len="med"/>
+                      <a:tailEnd type="none" w="med" len="med"/>
+                    </a:lnT>
+                    <a:lnB w="9525" cap="flat" cmpd="sng" algn="ctr">
+                      <a:solidFill>
+                        <a:srgbClr val="E5ECEB"/>
+                      </a:solidFill>
+                      <a:prstDash val="solid"/>
+                      <a:round/>
+                      <a:headEnd type="none" w="med" len="med"/>
+                      <a:tailEnd type="none" w="med" len="med"/>
+                    </a:lnB>
+                  </a:tcPr>
+                </a:tc>
+                <a:tc>
+                  <a:txBody>
+                    <a:bodyPr/>
+                    <a:lstStyle/>
+                    <a:p>
+                      <a:pPr fontAlgn="ctr"/>
+                      <a:r>
+                        <a:rPr lang="en-US" sz="1200" b="0">
+                          <a:solidFill>
+                            <a:srgbClr val="333E48"/>
+                          </a:solidFill>
+                          <a:effectLst/>
+                        </a:rPr>
+                        <a:t>FIQ/vFIQ</a:t>
+                      </a:r>
+                    </a:p>
+                  </a:txBody>
+                  <a:tcPr marL="112889" marR="112889" marT="70556" marB="70556" anchor="ctr">
+                    <a:lnL>
+                      <a:noFill/>
+                    </a:lnL>
+                    <a:lnR>
+                      <a:noFill/>
+                    </a:lnR>
+                    <a:lnT w="9525" cap="flat" cmpd="sng" algn="ctr">
+                      <a:solidFill>
+                        <a:srgbClr val="E5ECEB"/>
+                      </a:solidFill>
+                      <a:prstDash val="solid"/>
+                      <a:round/>
+                      <a:headEnd type="none" w="med" len="med"/>
+                      <a:tailEnd type="none" w="med" len="med"/>
+                    </a:lnT>
+                    <a:lnB w="9525" cap="flat" cmpd="sng" algn="ctr">
+                      <a:solidFill>
+                        <a:srgbClr val="E5ECEB"/>
+                      </a:solidFill>
+                      <a:prstDash val="solid"/>
+                      <a:round/>
+                      <a:headEnd type="none" w="med" len="med"/>
+                      <a:tailEnd type="none" w="med" len="med"/>
+                    </a:lnB>
+                  </a:tcPr>
+                </a:tc>
+                <a:tc vMerge="1">
+                  <a:txBody>
+                    <a:bodyPr/>
+                    <a:lstStyle/>
+                    <a:p>
+                      <a:endParaRPr lang="en-US"/>
+                    </a:p>
+                  </a:txBody>
+                  <a:tcPr/>
+                </a:tc>
+                <a:extLst>
+                  <a:ext uri="{0D108BD9-81ED-4DB2-BD59-A6C34878D82A}">
+                    <a16:rowId xmlns:a16="http://schemas.microsoft.com/office/drawing/2014/main" val="4131092273"/>
+                  </a:ext>
+                </a:extLst>
+              </a:tr>
+              <a:tr h="344311">
+                <a:tc>
+                  <a:txBody>
+                    <a:bodyPr/>
+                    <a:lstStyle/>
+                    <a:p>
+                      <a:pPr marL="0" marR="0" lvl="0" indent="0" algn="l" defTabSz="914400" rtl="0" eaLnBrk="1" fontAlgn="ctr" latinLnBrk="0" hangingPunct="1">
+                        <a:lnSpc>
+                          <a:spcPct val="100000"/>
+                        </a:lnSpc>
+                        <a:spcBef>
+                          <a:spcPts val="0"/>
+                        </a:spcBef>
+                        <a:spcAft>
+                          <a:spcPts val="0"/>
+                        </a:spcAft>
+                        <a:buClrTx/>
+                        <a:buSzTx/>
+                        <a:buFontTx/>
+                        <a:buNone/>
+                        <a:tabLst/>
+                        <a:defRPr/>
+                      </a:pPr>
+                      <a:r>
+                        <a:rPr lang="en-US" sz="1200" b="0" dirty="0">
+                          <a:solidFill>
+                            <a:srgbClr val="333E48"/>
+                          </a:solidFill>
+                          <a:effectLst/>
+                        </a:rPr>
+                        <a:t>128 (0x80)</a:t>
+                      </a:r>
+                    </a:p>
+                  </a:txBody>
+                  <a:tcPr marL="112889" marR="112889" marT="70556" marB="70556" anchor="ctr">
+                    <a:lnL>
+                      <a:noFill/>
+                    </a:lnL>
+                    <a:lnR>
+                      <a:noFill/>
+                    </a:lnR>
+                    <a:lnT w="9525" cap="flat" cmpd="sng" algn="ctr">
+                      <a:solidFill>
+                        <a:srgbClr val="E5ECEB"/>
+                      </a:solidFill>
+                      <a:prstDash val="solid"/>
+                      <a:round/>
+                      <a:headEnd type="none" w="med" len="med"/>
+                      <a:tailEnd type="none" w="med" len="med"/>
+                    </a:lnT>
+                    <a:lnB>
+                      <a:noFill/>
+                    </a:lnB>
+                  </a:tcPr>
+                </a:tc>
+                <a:tc>
+                  <a:txBody>
+                    <a:bodyPr/>
+                    <a:lstStyle/>
+                    <a:p>
+                      <a:pPr fontAlgn="ctr"/>
+                      <a:r>
+                        <a:rPr lang="en-US" sz="1200" b="0" dirty="0" err="1">
+                          <a:solidFill>
+                            <a:srgbClr val="333E48"/>
+                          </a:solidFill>
+                          <a:effectLst/>
+                        </a:rPr>
+                        <a:t>SError</a:t>
+                      </a:r>
+                      <a:r>
+                        <a:rPr lang="en-US" sz="1200" b="0" dirty="0">
+                          <a:solidFill>
+                            <a:srgbClr val="333E48"/>
+                          </a:solidFill>
+                          <a:effectLst/>
+                        </a:rPr>
+                        <a:t>/</a:t>
+                      </a:r>
+                      <a:r>
+                        <a:rPr lang="en-US" sz="1200" b="0" dirty="0" err="1">
+                          <a:solidFill>
+                            <a:srgbClr val="333E48"/>
+                          </a:solidFill>
+                          <a:effectLst/>
+                        </a:rPr>
+                        <a:t>vSError</a:t>
+                      </a:r>
+                      <a:endParaRPr lang="en-US" sz="1200" b="0" dirty="0">
+                        <a:solidFill>
+                          <a:srgbClr val="333E48"/>
+                        </a:solidFill>
+                        <a:effectLst/>
+                      </a:endParaRPr>
+                    </a:p>
+                  </a:txBody>
+                  <a:tcPr marL="112889" marR="112889" marT="70556" marB="70556" anchor="ctr">
+                    <a:lnL>
+                      <a:noFill/>
+                    </a:lnL>
+                    <a:lnR>
+                      <a:noFill/>
+                    </a:lnR>
+                    <a:lnT w="9525" cap="flat" cmpd="sng" algn="ctr">
+                      <a:solidFill>
+                        <a:srgbClr val="E5ECEB"/>
+                      </a:solidFill>
+                      <a:prstDash val="solid"/>
+                      <a:round/>
+                      <a:headEnd type="none" w="med" len="med"/>
+                      <a:tailEnd type="none" w="med" len="med"/>
+                    </a:lnT>
+                    <a:lnB>
+                      <a:noFill/>
+                    </a:lnB>
+                  </a:tcPr>
+                </a:tc>
+                <a:tc vMerge="1">
+                  <a:txBody>
+                    <a:bodyPr/>
+                    <a:lstStyle/>
+                    <a:p>
+                      <a:endParaRPr lang="en-US"/>
+                    </a:p>
+                  </a:txBody>
+                  <a:tcPr/>
+                </a:tc>
+                <a:extLst>
+                  <a:ext uri="{0D108BD9-81ED-4DB2-BD59-A6C34878D82A}">
+                    <a16:rowId xmlns:a16="http://schemas.microsoft.com/office/drawing/2014/main" val="3426667766"/>
+                  </a:ext>
+                </a:extLst>
+              </a:tr>
+            </a:tbl>
+          </a:graphicData>
+        </a:graphic>
+      </p:graphicFrame>
+      <p:sp>
+        <p:nvSpPr>
+          <p:cNvPr id="2" name="Right Brace 1">
+            <a:extLst>
+              <a:ext uri="{FF2B5EF4-FFF2-40B4-BE49-F238E27FC236}">
+                <a16:creationId xmlns:a16="http://schemas.microsoft.com/office/drawing/2014/main" id="{CAB7AD9C-E539-4FC2-B724-64D6DBE1F5B5}"/>
+              </a:ext>
+            </a:extLst>
+          </p:cNvPr>
+          <p:cNvSpPr/>
+          <p:nvPr/>
+        </p:nvSpPr>
+        <p:spPr>
+          <a:xfrm>
+            <a:off x="4745231" y="1262849"/>
+            <a:ext cx="314326" cy="1284923"/>
+          </a:xfrm>
+          <a:prstGeom prst="rightBrace">
+            <a:avLst/>
+          </a:prstGeom>
+          <a:ln w="57150">
+            <a:solidFill>
+              <a:schemeClr val="accent2"/>
+            </a:solidFill>
+            <a:headEnd type="none" w="med" len="med"/>
+            <a:tailEnd type="none" w="med" len="med"/>
+          </a:ln>
+        </p:spPr>
+        <p:style>
+          <a:lnRef idx="1">
+            <a:schemeClr val="accent1"/>
+          </a:lnRef>
+          <a:fillRef idx="0">
+            <a:schemeClr val="accent1"/>
+          </a:fillRef>
+          <a:effectRef idx="0">
+            <a:schemeClr val="accent1"/>
+          </a:effectRef>
+          <a:fontRef idx="minor">
+            <a:schemeClr val="tx1"/>
+          </a:fontRef>
+        </p:style>
+        <p:txBody>
+          <a:bodyPr rtlCol="0" anchor="ctr"/>
+          <a:lstStyle/>
+          <a:p>
+            <a:pPr algn="ctr"/>
+            <a:endParaRPr lang="en-US"/>
+          </a:p>
+        </p:txBody>
+      </p:sp>
+      <p:sp>
+        <p:nvSpPr>
+          <p:cNvPr id="5" name="Right Brace 4">
+            <a:extLst>
+              <a:ext uri="{FF2B5EF4-FFF2-40B4-BE49-F238E27FC236}">
+                <a16:creationId xmlns:a16="http://schemas.microsoft.com/office/drawing/2014/main" id="{2FDEE2C0-2456-414D-BCE4-5A06E8FC2A4B}"/>
+              </a:ext>
+            </a:extLst>
+          </p:cNvPr>
+          <p:cNvSpPr/>
+          <p:nvPr/>
+        </p:nvSpPr>
+        <p:spPr>
+          <a:xfrm>
+            <a:off x="4745231" y="2648736"/>
+            <a:ext cx="314326" cy="1284923"/>
+          </a:xfrm>
+          <a:prstGeom prst="rightBrace">
+            <a:avLst/>
+          </a:prstGeom>
+          <a:ln w="57150">
+            <a:solidFill>
+              <a:schemeClr val="accent2"/>
+            </a:solidFill>
+            <a:headEnd type="none" w="med" len="med"/>
+            <a:tailEnd type="none" w="med" len="med"/>
+          </a:ln>
+        </p:spPr>
+        <p:style>
+          <a:lnRef idx="1">
+            <a:schemeClr val="accent1"/>
+          </a:lnRef>
+          <a:fillRef idx="0">
+            <a:schemeClr val="accent1"/>
+          </a:fillRef>
+          <a:effectRef idx="0">
+            <a:schemeClr val="accent1"/>
+          </a:effectRef>
+          <a:fontRef idx="minor">
+            <a:schemeClr val="tx1"/>
+          </a:fontRef>
+        </p:style>
+        <p:txBody>
+          <a:bodyPr rtlCol="0" anchor="ctr"/>
+          <a:lstStyle/>
+          <a:p>
+            <a:pPr algn="ctr"/>
+            <a:endParaRPr lang="en-US"/>
+          </a:p>
+        </p:txBody>
+      </p:sp>
+      <p:sp>
+        <p:nvSpPr>
+          <p:cNvPr id="6" name="Right Brace 5">
+            <a:extLst>
+              <a:ext uri="{FF2B5EF4-FFF2-40B4-BE49-F238E27FC236}">
+                <a16:creationId xmlns:a16="http://schemas.microsoft.com/office/drawing/2014/main" id="{9B187D8A-99FB-4435-BAD7-680F170FCD74}"/>
+              </a:ext>
+            </a:extLst>
+          </p:cNvPr>
+          <p:cNvSpPr/>
+          <p:nvPr/>
+        </p:nvSpPr>
+        <p:spPr>
+          <a:xfrm>
+            <a:off x="4745231" y="4044394"/>
+            <a:ext cx="314326" cy="1284923"/>
+          </a:xfrm>
+          <a:prstGeom prst="rightBrace">
+            <a:avLst/>
+          </a:prstGeom>
+          <a:ln w="57150">
+            <a:solidFill>
+              <a:schemeClr val="accent2"/>
+            </a:solidFill>
+            <a:headEnd type="none" w="med" len="med"/>
+            <a:tailEnd type="none" w="med" len="med"/>
+          </a:ln>
+        </p:spPr>
+        <p:style>
+          <a:lnRef idx="1">
+            <a:schemeClr val="accent1"/>
+          </a:lnRef>
+          <a:fillRef idx="0">
+            <a:schemeClr val="accent1"/>
+          </a:fillRef>
+          <a:effectRef idx="0">
+            <a:schemeClr val="accent1"/>
+          </a:effectRef>
+          <a:fontRef idx="minor">
+            <a:schemeClr val="tx1"/>
+          </a:fontRef>
+        </p:style>
+        <p:txBody>
+          <a:bodyPr rtlCol="0" anchor="ctr"/>
+          <a:lstStyle/>
+          <a:p>
+            <a:pPr algn="ctr"/>
+            <a:endParaRPr lang="en-US"/>
+          </a:p>
+        </p:txBody>
+      </p:sp>
+      <p:sp>
+        <p:nvSpPr>
+          <p:cNvPr id="8" name="Right Brace 7">
+            <a:extLst>
+              <a:ext uri="{FF2B5EF4-FFF2-40B4-BE49-F238E27FC236}">
+                <a16:creationId xmlns:a16="http://schemas.microsoft.com/office/drawing/2014/main" id="{B3F207D3-7FCD-4C5B-9C45-DE868089870F}"/>
+              </a:ext>
+            </a:extLst>
+          </p:cNvPr>
+          <p:cNvSpPr/>
+          <p:nvPr/>
+        </p:nvSpPr>
+        <p:spPr>
+          <a:xfrm>
+            <a:off x="4745231" y="5384685"/>
+            <a:ext cx="314326" cy="1284923"/>
+          </a:xfrm>
+          <a:prstGeom prst="rightBrace">
+            <a:avLst/>
+          </a:prstGeom>
+          <a:ln w="57150">
+            <a:solidFill>
+              <a:schemeClr val="accent2"/>
+            </a:solidFill>
+            <a:headEnd type="none" w="med" len="med"/>
+            <a:tailEnd type="none" w="med" len="med"/>
+          </a:ln>
+        </p:spPr>
+        <p:style>
+          <a:lnRef idx="1">
+            <a:schemeClr val="accent1"/>
+          </a:lnRef>
+          <a:fillRef idx="0">
+            <a:schemeClr val="accent1"/>
+          </a:fillRef>
+          <a:effectRef idx="0">
+            <a:schemeClr val="accent1"/>
+          </a:effectRef>
+          <a:fontRef idx="minor">
+            <a:schemeClr val="tx1"/>
+          </a:fontRef>
+        </p:style>
+        <p:txBody>
+          <a:bodyPr rtlCol="0" anchor="ctr"/>
+          <a:lstStyle/>
+          <a:p>
+            <a:pPr algn="ctr"/>
+            <a:endParaRPr lang="en-US"/>
+          </a:p>
+        </p:txBody>
+      </p:sp>
+      <p:sp>
+        <p:nvSpPr>
+          <p:cNvPr id="9" name="TextBox 8">
+            <a:extLst>
+              <a:ext uri="{FF2B5EF4-FFF2-40B4-BE49-F238E27FC236}">
+                <a16:creationId xmlns:a16="http://schemas.microsoft.com/office/drawing/2014/main" id="{BE3BE00D-F850-4320-9BB7-AE07DA946AA7}"/>
+              </a:ext>
+            </a:extLst>
+          </p:cNvPr>
+          <p:cNvSpPr txBox="1"/>
+          <p:nvPr/>
+        </p:nvSpPr>
+        <p:spPr>
+          <a:xfrm>
+            <a:off x="376720" y="1471408"/>
+            <a:ext cx="1341243" cy="369332"/>
+          </a:xfrm>
+          <a:prstGeom prst="rect">
+            <a:avLst/>
+          </a:prstGeom>
+          <a:noFill/>
+        </p:spPr>
+        <p:txBody>
+          <a:bodyPr wrap="square">
+            <a:spAutoFit/>
+          </a:bodyPr>
+          <a:lstStyle/>
+          <a:p>
+            <a:pPr fontAlgn="ctr"/>
+            <a:r>
+              <a:rPr lang="en-US" sz="1800" b="0" dirty="0">
+                <a:solidFill>
+                  <a:srgbClr val="333E48"/>
+                </a:solidFill>
+                <a:effectLst/>
+              </a:rPr>
+              <a:t>Low addr</a:t>
+            </a:r>
+          </a:p>
+        </p:txBody>
+      </p:sp>
+      <p:sp>
+        <p:nvSpPr>
+          <p:cNvPr id="10" name="TextBox 9">
+            <a:extLst>
+              <a:ext uri="{FF2B5EF4-FFF2-40B4-BE49-F238E27FC236}">
+                <a16:creationId xmlns:a16="http://schemas.microsoft.com/office/drawing/2014/main" id="{D8494200-9DAA-410A-9782-13EBADF35B96}"/>
+              </a:ext>
+            </a:extLst>
+          </p:cNvPr>
+          <p:cNvSpPr txBox="1"/>
+          <p:nvPr/>
+        </p:nvSpPr>
+        <p:spPr>
+          <a:xfrm>
+            <a:off x="376720" y="4364924"/>
+            <a:ext cx="4572000" cy="369332"/>
+          </a:xfrm>
+          <a:prstGeom prst="rect">
+            <a:avLst/>
+          </a:prstGeom>
+          <a:noFill/>
+        </p:spPr>
+        <p:txBody>
+          <a:bodyPr wrap="square">
+            <a:spAutoFit/>
+          </a:bodyPr>
+          <a:lstStyle/>
+          <a:p>
+            <a:pPr fontAlgn="ctr"/>
+            <a:r>
+              <a:rPr lang="en-US" sz="1800" b="0" dirty="0">
+                <a:solidFill>
+                  <a:srgbClr val="333E48"/>
+                </a:solidFill>
+                <a:effectLst/>
+              </a:rPr>
+              <a:t>High addr</a:t>
+            </a:r>
+          </a:p>
+        </p:txBody>
+      </p:sp>
+      <p:sp>
+        <p:nvSpPr>
+          <p:cNvPr id="11" name="Arrow: Down 10">
+            <a:extLst>
+              <a:ext uri="{FF2B5EF4-FFF2-40B4-BE49-F238E27FC236}">
+                <a16:creationId xmlns:a16="http://schemas.microsoft.com/office/drawing/2014/main" id="{853FEE30-DDDF-4B70-AA66-0C7C1B078D33}"/>
+              </a:ext>
+            </a:extLst>
+          </p:cNvPr>
+          <p:cNvSpPr/>
+          <p:nvPr/>
+        </p:nvSpPr>
+        <p:spPr>
+          <a:xfrm>
+            <a:off x="849032" y="1905310"/>
+            <a:ext cx="339870" cy="2310931"/>
+          </a:xfrm>
+          <a:prstGeom prst="downArrow">
+            <a:avLst/>
+          </a:prstGeom>
+          <a:solidFill>
+            <a:schemeClr val="bg1">
+              <a:lumMod val="75000"/>
+            </a:schemeClr>
+          </a:solidFill>
+          <a:ln w="57150">
+            <a:noFill/>
+            <a:headEnd type="none" w="med" len="med"/>
+            <a:tailEnd type="none" w="med" len="med"/>
+          </a:ln>
+        </p:spPr>
+        <p:style>
+          <a:lnRef idx="1">
+            <a:schemeClr val="accent1"/>
+          </a:lnRef>
+          <a:fillRef idx="0">
+            <a:schemeClr val="accent1"/>
+          </a:fillRef>
+          <a:effectRef idx="0">
+            <a:schemeClr val="accent1"/>
+          </a:effectRef>
+          <a:fontRef idx="minor">
+            <a:schemeClr val="tx1"/>
+          </a:fontRef>
+        </p:style>
+        <p:txBody>
+          <a:bodyPr rtlCol="0" anchor="ctr"/>
+          <a:lstStyle/>
+          <a:p>
+            <a:pPr algn="ctr"/>
+            <a:endParaRPr lang="en-US"/>
+          </a:p>
+        </p:txBody>
+      </p:sp>
+      <p:sp>
+        <p:nvSpPr>
+          <p:cNvPr id="14" name="TextBox 13">
+            <a:extLst>
+              <a:ext uri="{FF2B5EF4-FFF2-40B4-BE49-F238E27FC236}">
+                <a16:creationId xmlns:a16="http://schemas.microsoft.com/office/drawing/2014/main" id="{ED56F4DF-B879-40B6-BB01-D4E6D9DCECAF}"/>
+              </a:ext>
+            </a:extLst>
+          </p:cNvPr>
+          <p:cNvSpPr txBox="1"/>
+          <p:nvPr/>
+        </p:nvSpPr>
+        <p:spPr>
+          <a:xfrm>
+            <a:off x="678008" y="506796"/>
+            <a:ext cx="1089831" cy="369332"/>
+          </a:xfrm>
+          <a:prstGeom prst="rect">
+            <a:avLst/>
+          </a:prstGeom>
+        </p:spPr>
+        <p:style>
+          <a:lnRef idx="2">
+            <a:schemeClr val="accent1">
+              <a:shade val="50000"/>
+            </a:schemeClr>
+          </a:lnRef>
+          <a:fillRef idx="1">
+            <a:schemeClr val="accent1"/>
+          </a:fillRef>
+          <a:effectRef idx="0">
+            <a:schemeClr val="accent1"/>
+          </a:effectRef>
+          <a:fontRef idx="minor">
+            <a:schemeClr val="lt1"/>
+          </a:fontRef>
+        </p:style>
+        <p:txBody>
+          <a:bodyPr wrap="square">
+            <a:spAutoFit/>
+          </a:bodyPr>
+          <a:lstStyle/>
+          <a:p>
+            <a:r>
+              <a:rPr lang="en-US" b="0" i="0" dirty="0">
+                <a:solidFill>
+                  <a:schemeClr val="bg1"/>
+                </a:solidFill>
+                <a:effectLst/>
+                <a:latin typeface="Lato" panose="020F0502020204030203" pitchFamily="34" charset="0"/>
+              </a:rPr>
+              <a:t>vbar_el1</a:t>
+            </a:r>
+            <a:endParaRPr lang="en-US" dirty="0">
+              <a:solidFill>
+                <a:schemeClr val="bg1"/>
+              </a:solidFill>
+            </a:endParaRPr>
+          </a:p>
+        </p:txBody>
+      </p:sp>
+      <p:sp>
+        <p:nvSpPr>
+          <p:cNvPr id="16" name="Arrow: Bent-Up 15">
+            <a:extLst>
+              <a:ext uri="{FF2B5EF4-FFF2-40B4-BE49-F238E27FC236}">
+                <a16:creationId xmlns:a16="http://schemas.microsoft.com/office/drawing/2014/main" id="{79BACF3F-FB85-46F1-920C-16CB9ED39C6B}"/>
+              </a:ext>
+            </a:extLst>
+          </p:cNvPr>
+          <p:cNvSpPr/>
+          <p:nvPr/>
+        </p:nvSpPr>
+        <p:spPr>
+          <a:xfrm rot="16200000" flipH="1" flipV="1">
+            <a:off x="1159739" y="951012"/>
+            <a:ext cx="427659" cy="369332"/>
+          </a:xfrm>
+          <a:prstGeom prst="bentUpArrow">
+            <a:avLst/>
+          </a:prstGeom>
+        </p:spPr>
+        <p:style>
+          <a:lnRef idx="2">
+            <a:schemeClr val="accent1">
+              <a:shade val="50000"/>
+            </a:schemeClr>
+          </a:lnRef>
+          <a:fillRef idx="1">
+            <a:schemeClr val="accent1"/>
+          </a:fillRef>
+          <a:effectRef idx="0">
+            <a:schemeClr val="accent1"/>
+          </a:effectRef>
+          <a:fontRef idx="minor">
+            <a:schemeClr val="lt1"/>
+          </a:fontRef>
+        </p:style>
+        <p:txBody>
+          <a:bodyPr rtlCol="0" anchor="ctr"/>
+          <a:lstStyle/>
+          <a:p>
+            <a:pPr algn="ctr"/>
+            <a:endParaRPr lang="en-US"/>
+          </a:p>
+        </p:txBody>
+      </p:sp>
+    </p:spTree>
+    <p:extLst>
+      <p:ext uri="{BB962C8B-B14F-4D97-AF65-F5344CB8AC3E}">
         <p14:creationId xmlns:p14="http://schemas.microsoft.com/office/powerpoint/2010/main" val="3981172867"/>
       </p:ext>
     </p:extLst>
@@ -6709,7 +9446,7 @@
 </p:sld>
 </file>
 
-<file path=ppt/slides/slide2.xml><?xml version="1.0" encoding="utf-8"?>
+<file path=ppt/slides/slide3.xml><?xml version="1.0" encoding="utf-8"?>
 <p:sld xmlns:a="http://schemas.openxmlformats.org/drawingml/2006/main" xmlns:r="http://schemas.openxmlformats.org/officeDocument/2006/relationships" xmlns:p="http://schemas.openxmlformats.org/presentationml/2006/main">
   <p:cSld>
     <p:spTree>
@@ -8593,7 +11330,7 @@
 </p:sld>
 </file>
 
-<file path=ppt/slides/slide3.xml><?xml version="1.0" encoding="utf-8"?>
+<file path=ppt/slides/slide4.xml><?xml version="1.0" encoding="utf-8"?>
 <p:sld xmlns:a="http://schemas.openxmlformats.org/drawingml/2006/main" xmlns:r="http://schemas.openxmlformats.org/officeDocument/2006/relationships" xmlns:p="http://schemas.openxmlformats.org/presentationml/2006/main">
   <p:cSld>
     <p:spTree>
@@ -8659,7 +11396,7 @@
 </p:sld>
 </file>
 
-<file path=ppt/slides/slide4.xml><?xml version="1.0" encoding="utf-8"?>
+<file path=ppt/slides/slide5.xml><?xml version="1.0" encoding="utf-8"?>
 <p:sld xmlns:a="http://schemas.openxmlformats.org/drawingml/2006/main" xmlns:r="http://schemas.openxmlformats.org/officeDocument/2006/relationships" xmlns:p="http://schemas.openxmlformats.org/presentationml/2006/main">
   <p:cSld>
     <p:spTree>
@@ -10693,7 +13430,7 @@
 </p:sld>
 </file>
 
-<file path=ppt/slides/slide5.xml><?xml version="1.0" encoding="utf-8"?>
+<file path=ppt/slides/slide6.xml><?xml version="1.0" encoding="utf-8"?>
 <p:sld xmlns:a="http://schemas.openxmlformats.org/drawingml/2006/main" xmlns:r="http://schemas.openxmlformats.org/officeDocument/2006/relationships" xmlns:p="http://schemas.openxmlformats.org/presentationml/2006/main">
   <p:cSld>
     <p:spTree>
@@ -13395,7 +16132,7 @@
 </p:sld>
 </file>
 
-<file path=ppt/slides/slide6.xml><?xml version="1.0" encoding="utf-8"?>
+<file path=ppt/slides/slide7.xml><?xml version="1.0" encoding="utf-8"?>
 <p:sld xmlns:a="http://schemas.openxmlformats.org/drawingml/2006/main" xmlns:r="http://schemas.openxmlformats.org/officeDocument/2006/relationships" xmlns:p="http://schemas.openxmlformats.org/presentationml/2006/main">
   <p:cSld>
     <p:spTree>

</xml_diff>